<commit_message>
added worknotes for slides and added first slide!
</commit_message>
<xml_diff>
--- a/Slide Tesi.pptx
+++ b/Slide Tesi.pptx
@@ -5,15 +5,17 @@
     <p:sldMasterId id="2147483648" r:id="rId1"/>
   </p:sldMasterIdLst>
   <p:notesMasterIdLst>
-    <p:notesMasterId r:id="rId5"/>
+    <p:notesMasterId r:id="rId7"/>
   </p:notesMasterIdLst>
   <p:handoutMasterIdLst>
-    <p:handoutMasterId r:id="rId6"/>
+    <p:handoutMasterId r:id="rId8"/>
   </p:handoutMasterIdLst>
   <p:sldIdLst>
     <p:sldId id="256" r:id="rId2"/>
     <p:sldId id="257" r:id="rId3"/>
     <p:sldId id="258" r:id="rId4"/>
+    <p:sldId id="259" r:id="rId5"/>
+    <p:sldId id="260" r:id="rId6"/>
   </p:sldIdLst>
   <p:sldSz cx="9144000" cy="6858000" type="screen4x3"/>
   <p:notesSz cx="6858000" cy="9144000"/>
@@ -112,6 +114,22 @@
       </a:defRPr>
     </a:lvl9pPr>
   </p:defaultTextStyle>
+  <p:extLst>
+    <p:ext uri="{EFAFB233-063F-42B5-8137-9DF3F51BA10A}">
+      <p15:sldGuideLst xmlns:p15="http://schemas.microsoft.com/office/powerpoint/2012/main">
+        <p15:guide id="1" orient="horz" pos="1806">
+          <p15:clr>
+            <a:srgbClr val="A4A3A4"/>
+          </p15:clr>
+        </p15:guide>
+        <p15:guide id="2" pos="456">
+          <p15:clr>
+            <a:srgbClr val="A4A3A4"/>
+          </p15:clr>
+        </p15:guide>
+      </p15:sldGuideLst>
+    </p:ext>
+  </p:extLst>
 </p:presentation>
 </file>
 
@@ -198,7 +216,7 @@
             <a:fld id="{45BF3CCC-77DD-F84F-A249-CA3C5045A043}" type="datetime1">
               <a:rPr lang="it-IT" smtClean="0"/>
               <a:pPr/>
-              <a:t>05/10/2015</a:t>
+              <a:t>24/06/2019</a:t>
             </a:fld>
             <a:endParaRPr lang="it-IT"/>
           </a:p>
@@ -274,7 +292,7 @@
     </p:spTree>
     <p:extLst>
       <p:ext uri="{BB962C8B-B14F-4D97-AF65-F5344CB8AC3E}">
-        <p14:creationId xmlns="" xmlns:p14="http://schemas.microsoft.com/office/powerpoint/2010/main" val="23914858"/>
+        <p14:creationId xmlns:p14="http://schemas.microsoft.com/office/powerpoint/2010/main" val="23914858"/>
       </p:ext>
     </p:extLst>
   </p:cSld>
@@ -366,7 +384,7 @@
             <a:fld id="{FE692227-D6DC-FD45-9507-DB2BAD58473C}" type="datetime1">
               <a:rPr lang="it-IT" smtClean="0"/>
               <a:pPr/>
-              <a:t>05/10/2015</a:t>
+              <a:t>24/06/2019</a:t>
             </a:fld>
             <a:endParaRPr lang="it-IT"/>
           </a:p>
@@ -430,38 +448,37 @@
           <a:p>
             <a:pPr lvl="0"/>
             <a:r>
-              <a:rPr lang="it-IT" smtClean="0"/>
+              <a:rPr lang="it-IT"/>
               <a:t>Fare clic per modificare gli stili del testo dello schema</a:t>
             </a:r>
           </a:p>
           <a:p>
             <a:pPr lvl="1"/>
             <a:r>
-              <a:rPr lang="it-IT" smtClean="0"/>
+              <a:rPr lang="it-IT"/>
               <a:t>Secondo livello</a:t>
             </a:r>
           </a:p>
           <a:p>
             <a:pPr lvl="2"/>
             <a:r>
-              <a:rPr lang="it-IT" smtClean="0"/>
+              <a:rPr lang="it-IT"/>
               <a:t>Terzo livello</a:t>
             </a:r>
           </a:p>
           <a:p>
             <a:pPr lvl="3"/>
             <a:r>
-              <a:rPr lang="it-IT" smtClean="0"/>
+              <a:rPr lang="it-IT"/>
               <a:t>Quarto livello</a:t>
             </a:r>
           </a:p>
           <a:p>
             <a:pPr lvl="4"/>
             <a:r>
-              <a:rPr lang="it-IT" smtClean="0"/>
+              <a:rPr lang="it-IT"/>
               <a:t>Quinto livello</a:t>
             </a:r>
-            <a:endParaRPr lang="it-IT"/>
           </a:p>
         </p:txBody>
       </p:sp>
@@ -535,7 +552,7 @@
     </p:spTree>
     <p:extLst>
       <p:ext uri="{BB962C8B-B14F-4D97-AF65-F5344CB8AC3E}">
-        <p14:creationId xmlns="" xmlns:p14="http://schemas.microsoft.com/office/powerpoint/2010/main" val="2162096253"/>
+        <p14:creationId xmlns:p14="http://schemas.microsoft.com/office/powerpoint/2010/main" val="2162096253"/>
       </p:ext>
     </p:extLst>
   </p:cSld>
@@ -711,7 +728,7 @@
     </p:spTree>
     <p:extLst>
       <p:ext uri="{BB962C8B-B14F-4D97-AF65-F5344CB8AC3E}">
-        <p14:creationId xmlns="" xmlns:p14="http://schemas.microsoft.com/office/powerpoint/2010/main" val="3156239075"/>
+        <p14:creationId xmlns:p14="http://schemas.microsoft.com/office/powerpoint/2010/main" val="3156239075"/>
       </p:ext>
     </p:extLst>
   </p:cSld>
@@ -796,7 +813,177 @@
     </p:spTree>
     <p:extLst>
       <p:ext uri="{BB962C8B-B14F-4D97-AF65-F5344CB8AC3E}">
-        <p14:creationId xmlns="" xmlns:p14="http://schemas.microsoft.com/office/powerpoint/2010/main" val="3156239075"/>
+        <p14:creationId xmlns:p14="http://schemas.microsoft.com/office/powerpoint/2010/main" val="3156239075"/>
+      </p:ext>
+    </p:extLst>
+  </p:cSld>
+  <p:clrMapOvr>
+    <a:masterClrMapping/>
+  </p:clrMapOvr>
+</p:notes>
+</file>
+
+<file path=ppt/notesSlides/notesSlide3.xml><?xml version="1.0" encoding="utf-8"?>
+<p:notes xmlns:a="http://schemas.openxmlformats.org/drawingml/2006/main" xmlns:r="http://schemas.openxmlformats.org/officeDocument/2006/relationships" xmlns:p="http://schemas.openxmlformats.org/presentationml/2006/main">
+  <p:cSld>
+    <p:spTree>
+      <p:nvGrpSpPr>
+        <p:cNvPr id="1" name=""/>
+        <p:cNvGrpSpPr/>
+        <p:nvPr/>
+      </p:nvGrpSpPr>
+      <p:grpSpPr>
+        <a:xfrm>
+          <a:off x="0" y="0"/>
+          <a:ext cx="0" cy="0"/>
+          <a:chOff x="0" y="0"/>
+          <a:chExt cx="0" cy="0"/>
+        </a:xfrm>
+      </p:grpSpPr>
+      <p:sp>
+        <p:nvSpPr>
+          <p:cNvPr id="2" name="Segnaposto immagine diapositiva 1"/>
+          <p:cNvSpPr>
+            <a:spLocks noGrp="1" noRot="1" noChangeAspect="1"/>
+          </p:cNvSpPr>
+          <p:nvPr>
+            <p:ph type="sldImg"/>
+          </p:nvPr>
+        </p:nvSpPr>
+        <p:spPr/>
+      </p:sp>
+      <p:sp>
+        <p:nvSpPr>
+          <p:cNvPr id="3" name="Segnaposto note 2"/>
+          <p:cNvSpPr>
+            <a:spLocks noGrp="1"/>
+          </p:cNvSpPr>
+          <p:nvPr>
+            <p:ph type="body" idx="1"/>
+          </p:nvPr>
+        </p:nvSpPr>
+        <p:spPr/>
+        <p:txBody>
+          <a:bodyPr/>
+          <a:lstStyle/>
+          <a:p>
+            <a:endParaRPr lang="it-IT"/>
+          </a:p>
+        </p:txBody>
+      </p:sp>
+      <p:sp>
+        <p:nvSpPr>
+          <p:cNvPr id="4" name="Segnaposto numero diapositiva 3"/>
+          <p:cNvSpPr>
+            <a:spLocks noGrp="1"/>
+          </p:cNvSpPr>
+          <p:nvPr>
+            <p:ph type="sldNum" sz="quarter" idx="10"/>
+          </p:nvPr>
+        </p:nvSpPr>
+        <p:spPr/>
+        <p:txBody>
+          <a:bodyPr/>
+          <a:lstStyle/>
+          <a:p>
+            <a:fld id="{96986711-015B-0142-88C4-65D50E44FA77}" type="slidenum">
+              <a:rPr lang="it-IT" smtClean="0"/>
+              <a:pPr/>
+              <a:t>4</a:t>
+            </a:fld>
+            <a:endParaRPr lang="it-IT"/>
+          </a:p>
+        </p:txBody>
+      </p:sp>
+    </p:spTree>
+    <p:extLst>
+      <p:ext uri="{BB962C8B-B14F-4D97-AF65-F5344CB8AC3E}">
+        <p14:creationId xmlns:p14="http://schemas.microsoft.com/office/powerpoint/2010/main" val="3021660414"/>
+      </p:ext>
+    </p:extLst>
+  </p:cSld>
+  <p:clrMapOvr>
+    <a:masterClrMapping/>
+  </p:clrMapOvr>
+</p:notes>
+</file>
+
+<file path=ppt/notesSlides/notesSlide4.xml><?xml version="1.0" encoding="utf-8"?>
+<p:notes xmlns:a="http://schemas.openxmlformats.org/drawingml/2006/main" xmlns:r="http://schemas.openxmlformats.org/officeDocument/2006/relationships" xmlns:p="http://schemas.openxmlformats.org/presentationml/2006/main">
+  <p:cSld>
+    <p:spTree>
+      <p:nvGrpSpPr>
+        <p:cNvPr id="1" name=""/>
+        <p:cNvGrpSpPr/>
+        <p:nvPr/>
+      </p:nvGrpSpPr>
+      <p:grpSpPr>
+        <a:xfrm>
+          <a:off x="0" y="0"/>
+          <a:ext cx="0" cy="0"/>
+          <a:chOff x="0" y="0"/>
+          <a:chExt cx="0" cy="0"/>
+        </a:xfrm>
+      </p:grpSpPr>
+      <p:sp>
+        <p:nvSpPr>
+          <p:cNvPr id="2" name="Segnaposto immagine diapositiva 1"/>
+          <p:cNvSpPr>
+            <a:spLocks noGrp="1" noRot="1" noChangeAspect="1"/>
+          </p:cNvSpPr>
+          <p:nvPr>
+            <p:ph type="sldImg"/>
+          </p:nvPr>
+        </p:nvSpPr>
+        <p:spPr/>
+      </p:sp>
+      <p:sp>
+        <p:nvSpPr>
+          <p:cNvPr id="3" name="Segnaposto note 2"/>
+          <p:cNvSpPr>
+            <a:spLocks noGrp="1"/>
+          </p:cNvSpPr>
+          <p:nvPr>
+            <p:ph type="body" idx="1"/>
+          </p:nvPr>
+        </p:nvSpPr>
+        <p:spPr/>
+        <p:txBody>
+          <a:bodyPr/>
+          <a:lstStyle/>
+          <a:p>
+            <a:endParaRPr lang="it-IT"/>
+          </a:p>
+        </p:txBody>
+      </p:sp>
+      <p:sp>
+        <p:nvSpPr>
+          <p:cNvPr id="4" name="Segnaposto numero diapositiva 3"/>
+          <p:cNvSpPr>
+            <a:spLocks noGrp="1"/>
+          </p:cNvSpPr>
+          <p:nvPr>
+            <p:ph type="sldNum" sz="quarter" idx="10"/>
+          </p:nvPr>
+        </p:nvSpPr>
+        <p:spPr/>
+        <p:txBody>
+          <a:bodyPr/>
+          <a:lstStyle/>
+          <a:p>
+            <a:fld id="{96986711-015B-0142-88C4-65D50E44FA77}" type="slidenum">
+              <a:rPr lang="it-IT" smtClean="0"/>
+              <a:pPr/>
+              <a:t>5</a:t>
+            </a:fld>
+            <a:endParaRPr lang="it-IT"/>
+          </a:p>
+        </p:txBody>
+      </p:sp>
+    </p:spTree>
+    <p:extLst>
+      <p:ext uri="{BB962C8B-B14F-4D97-AF65-F5344CB8AC3E}">
+        <p14:creationId xmlns:p14="http://schemas.microsoft.com/office/powerpoint/2010/main" val="1384823024"/>
       </p:ext>
     </p:extLst>
   </p:cSld>
@@ -844,10 +1031,9 @@
           <a:lstStyle/>
           <a:p>
             <a:r>
-              <a:rPr lang="it-IT" smtClean="0"/>
+              <a:rPr lang="it-IT"/>
               <a:t>Fare clic per modificare stile</a:t>
             </a:r>
-            <a:endParaRPr lang="it-IT"/>
           </a:p>
         </p:txBody>
       </p:sp>
@@ -963,10 +1149,9 @@
           </a:lstStyle>
           <a:p>
             <a:r>
-              <a:rPr lang="it-IT" smtClean="0"/>
+              <a:rPr lang="it-IT"/>
               <a:t>Fare clic per modificare lo stile del sottotitolo dello schema</a:t>
             </a:r>
-            <a:endParaRPr lang="it-IT"/>
           </a:p>
         </p:txBody>
       </p:sp>
@@ -988,7 +1173,7 @@
             <a:fld id="{AD8BF249-6BAC-CD40-AAE9-334F110649E5}" type="datetimeFigureOut">
               <a:rPr lang="it-IT" smtClean="0"/>
               <a:pPr/>
-              <a:t>05/10/2015</a:t>
+              <a:t>24/06/2019</a:t>
             </a:fld>
             <a:endParaRPr lang="it-IT"/>
           </a:p>
@@ -1040,7 +1225,7 @@
     </p:spTree>
     <p:extLst>
       <p:ext uri="{BB962C8B-B14F-4D97-AF65-F5344CB8AC3E}">
-        <p14:creationId xmlns="" xmlns:p14="http://schemas.microsoft.com/office/powerpoint/2010/main" val="1697240551"/>
+        <p14:creationId xmlns:p14="http://schemas.microsoft.com/office/powerpoint/2010/main" val="1697240551"/>
       </p:ext>
     </p:extLst>
   </p:cSld>
@@ -1083,10 +1268,9 @@
           <a:lstStyle/>
           <a:p>
             <a:r>
-              <a:rPr lang="it-IT" smtClean="0"/>
+              <a:rPr lang="it-IT"/>
               <a:t>Fare clic per modificare stile</a:t>
             </a:r>
-            <a:endParaRPr lang="it-IT"/>
           </a:p>
         </p:txBody>
       </p:sp>
@@ -1107,38 +1291,37 @@
           <a:p>
             <a:pPr lvl="0"/>
             <a:r>
-              <a:rPr lang="it-IT" smtClean="0"/>
+              <a:rPr lang="it-IT"/>
               <a:t>Fare clic per modificare gli stili del testo dello schema</a:t>
             </a:r>
           </a:p>
           <a:p>
             <a:pPr lvl="1"/>
             <a:r>
-              <a:rPr lang="it-IT" smtClean="0"/>
+              <a:rPr lang="it-IT"/>
               <a:t>Secondo livello</a:t>
             </a:r>
           </a:p>
           <a:p>
             <a:pPr lvl="2"/>
             <a:r>
-              <a:rPr lang="it-IT" smtClean="0"/>
+              <a:rPr lang="it-IT"/>
               <a:t>Terzo livello</a:t>
             </a:r>
           </a:p>
           <a:p>
             <a:pPr lvl="3"/>
             <a:r>
-              <a:rPr lang="it-IT" smtClean="0"/>
+              <a:rPr lang="it-IT"/>
               <a:t>Quarto livello</a:t>
             </a:r>
           </a:p>
           <a:p>
             <a:pPr lvl="4"/>
             <a:r>
-              <a:rPr lang="it-IT" smtClean="0"/>
+              <a:rPr lang="it-IT"/>
               <a:t>Quinto livello</a:t>
             </a:r>
-            <a:endParaRPr lang="it-IT"/>
           </a:p>
         </p:txBody>
       </p:sp>
@@ -1160,7 +1343,7 @@
             <a:fld id="{AD8BF249-6BAC-CD40-AAE9-334F110649E5}" type="datetimeFigureOut">
               <a:rPr lang="it-IT" smtClean="0"/>
               <a:pPr/>
-              <a:t>05/10/2015</a:t>
+              <a:t>24/06/2019</a:t>
             </a:fld>
             <a:endParaRPr lang="it-IT"/>
           </a:p>
@@ -1212,7 +1395,7 @@
     </p:spTree>
     <p:extLst>
       <p:ext uri="{BB962C8B-B14F-4D97-AF65-F5344CB8AC3E}">
-        <p14:creationId xmlns="" xmlns:p14="http://schemas.microsoft.com/office/powerpoint/2010/main" val="4158563223"/>
+        <p14:creationId xmlns:p14="http://schemas.microsoft.com/office/powerpoint/2010/main" val="4158563223"/>
       </p:ext>
     </p:extLst>
   </p:cSld>
@@ -1260,10 +1443,9 @@
           <a:lstStyle/>
           <a:p>
             <a:r>
-              <a:rPr lang="it-IT" smtClean="0"/>
+              <a:rPr lang="it-IT"/>
               <a:t>Fare clic per modificare stile</a:t>
             </a:r>
-            <a:endParaRPr lang="it-IT"/>
           </a:p>
         </p:txBody>
       </p:sp>
@@ -1289,38 +1471,37 @@
           <a:p>
             <a:pPr lvl="0"/>
             <a:r>
-              <a:rPr lang="it-IT" smtClean="0"/>
+              <a:rPr lang="it-IT"/>
               <a:t>Fare clic per modificare gli stili del testo dello schema</a:t>
             </a:r>
           </a:p>
           <a:p>
             <a:pPr lvl="1"/>
             <a:r>
-              <a:rPr lang="it-IT" smtClean="0"/>
+              <a:rPr lang="it-IT"/>
               <a:t>Secondo livello</a:t>
             </a:r>
           </a:p>
           <a:p>
             <a:pPr lvl="2"/>
             <a:r>
-              <a:rPr lang="it-IT" smtClean="0"/>
+              <a:rPr lang="it-IT"/>
               <a:t>Terzo livello</a:t>
             </a:r>
           </a:p>
           <a:p>
             <a:pPr lvl="3"/>
             <a:r>
-              <a:rPr lang="it-IT" smtClean="0"/>
+              <a:rPr lang="it-IT"/>
               <a:t>Quarto livello</a:t>
             </a:r>
           </a:p>
           <a:p>
             <a:pPr lvl="4"/>
             <a:r>
-              <a:rPr lang="it-IT" smtClean="0"/>
+              <a:rPr lang="it-IT"/>
               <a:t>Quinto livello</a:t>
             </a:r>
-            <a:endParaRPr lang="it-IT"/>
           </a:p>
         </p:txBody>
       </p:sp>
@@ -1342,7 +1523,7 @@
             <a:fld id="{AD8BF249-6BAC-CD40-AAE9-334F110649E5}" type="datetimeFigureOut">
               <a:rPr lang="it-IT" smtClean="0"/>
               <a:pPr/>
-              <a:t>05/10/2015</a:t>
+              <a:t>24/06/2019</a:t>
             </a:fld>
             <a:endParaRPr lang="it-IT"/>
           </a:p>
@@ -1394,7 +1575,7 @@
     </p:spTree>
     <p:extLst>
       <p:ext uri="{BB962C8B-B14F-4D97-AF65-F5344CB8AC3E}">
-        <p14:creationId xmlns="" xmlns:p14="http://schemas.microsoft.com/office/powerpoint/2010/main" val="3881774806"/>
+        <p14:creationId xmlns:p14="http://schemas.microsoft.com/office/powerpoint/2010/main" val="3881774806"/>
       </p:ext>
     </p:extLst>
   </p:cSld>
@@ -1437,10 +1618,9 @@
           <a:lstStyle/>
           <a:p>
             <a:r>
-              <a:rPr lang="it-IT" smtClean="0"/>
+              <a:rPr lang="it-IT"/>
               <a:t>Fare clic per modificare stile</a:t>
             </a:r>
-            <a:endParaRPr lang="it-IT"/>
           </a:p>
         </p:txBody>
       </p:sp>
@@ -1461,38 +1641,37 @@
           <a:p>
             <a:pPr lvl="0"/>
             <a:r>
-              <a:rPr lang="it-IT" smtClean="0"/>
+              <a:rPr lang="it-IT"/>
               <a:t>Fare clic per modificare gli stili del testo dello schema</a:t>
             </a:r>
           </a:p>
           <a:p>
             <a:pPr lvl="1"/>
             <a:r>
-              <a:rPr lang="it-IT" smtClean="0"/>
+              <a:rPr lang="it-IT"/>
               <a:t>Secondo livello</a:t>
             </a:r>
           </a:p>
           <a:p>
             <a:pPr lvl="2"/>
             <a:r>
-              <a:rPr lang="it-IT" smtClean="0"/>
+              <a:rPr lang="it-IT"/>
               <a:t>Terzo livello</a:t>
             </a:r>
           </a:p>
           <a:p>
             <a:pPr lvl="3"/>
             <a:r>
-              <a:rPr lang="it-IT" smtClean="0"/>
+              <a:rPr lang="it-IT"/>
               <a:t>Quarto livello</a:t>
             </a:r>
           </a:p>
           <a:p>
             <a:pPr lvl="4"/>
             <a:r>
-              <a:rPr lang="it-IT" smtClean="0"/>
+              <a:rPr lang="it-IT"/>
               <a:t>Quinto livello</a:t>
             </a:r>
-            <a:endParaRPr lang="it-IT"/>
           </a:p>
         </p:txBody>
       </p:sp>
@@ -1514,7 +1693,7 @@
             <a:fld id="{AD8BF249-6BAC-CD40-AAE9-334F110649E5}" type="datetimeFigureOut">
               <a:rPr lang="it-IT" smtClean="0"/>
               <a:pPr/>
-              <a:t>05/10/2015</a:t>
+              <a:t>24/06/2019</a:t>
             </a:fld>
             <a:endParaRPr lang="it-IT"/>
           </a:p>
@@ -1566,7 +1745,7 @@
     </p:spTree>
     <p:extLst>
       <p:ext uri="{BB962C8B-B14F-4D97-AF65-F5344CB8AC3E}">
-        <p14:creationId xmlns="" xmlns:p14="http://schemas.microsoft.com/office/powerpoint/2010/main" val="1855808002"/>
+        <p14:creationId xmlns:p14="http://schemas.microsoft.com/office/powerpoint/2010/main" val="1855808002"/>
       </p:ext>
     </p:extLst>
   </p:cSld>
@@ -1618,10 +1797,9 @@
           </a:lstStyle>
           <a:p>
             <a:r>
-              <a:rPr lang="it-IT" smtClean="0"/>
+              <a:rPr lang="it-IT"/>
               <a:t>Fare clic per modificare stile</a:t>
             </a:r>
-            <a:endParaRPr lang="it-IT"/>
           </a:p>
         </p:txBody>
       </p:sp>
@@ -1738,7 +1916,7 @@
           <a:p>
             <a:pPr lvl="0"/>
             <a:r>
-              <a:rPr lang="it-IT" smtClean="0"/>
+              <a:rPr lang="it-IT"/>
               <a:t>Fare clic per modificare gli stili del testo dello schema</a:t>
             </a:r>
           </a:p>
@@ -1762,7 +1940,7 @@
             <a:fld id="{AD8BF249-6BAC-CD40-AAE9-334F110649E5}" type="datetimeFigureOut">
               <a:rPr lang="it-IT" smtClean="0"/>
               <a:pPr/>
-              <a:t>05/10/2015</a:t>
+              <a:t>24/06/2019</a:t>
             </a:fld>
             <a:endParaRPr lang="it-IT"/>
           </a:p>
@@ -1814,7 +1992,7 @@
     </p:spTree>
     <p:extLst>
       <p:ext uri="{BB962C8B-B14F-4D97-AF65-F5344CB8AC3E}">
-        <p14:creationId xmlns="" xmlns:p14="http://schemas.microsoft.com/office/powerpoint/2010/main" val="1538374943"/>
+        <p14:creationId xmlns:p14="http://schemas.microsoft.com/office/powerpoint/2010/main" val="1538374943"/>
       </p:ext>
     </p:extLst>
   </p:cSld>
@@ -1857,10 +2035,9 @@
           <a:lstStyle/>
           <a:p>
             <a:r>
-              <a:rPr lang="it-IT" smtClean="0"/>
+              <a:rPr lang="it-IT"/>
               <a:t>Fare clic per modificare stile</a:t>
             </a:r>
-            <a:endParaRPr lang="it-IT"/>
           </a:p>
         </p:txBody>
       </p:sp>
@@ -1914,38 +2091,37 @@
           <a:p>
             <a:pPr lvl="0"/>
             <a:r>
-              <a:rPr lang="it-IT" smtClean="0"/>
+              <a:rPr lang="it-IT"/>
               <a:t>Fare clic per modificare gli stili del testo dello schema</a:t>
             </a:r>
           </a:p>
           <a:p>
             <a:pPr lvl="1"/>
             <a:r>
-              <a:rPr lang="it-IT" smtClean="0"/>
+              <a:rPr lang="it-IT"/>
               <a:t>Secondo livello</a:t>
             </a:r>
           </a:p>
           <a:p>
             <a:pPr lvl="2"/>
             <a:r>
-              <a:rPr lang="it-IT" smtClean="0"/>
+              <a:rPr lang="it-IT"/>
               <a:t>Terzo livello</a:t>
             </a:r>
           </a:p>
           <a:p>
             <a:pPr lvl="3"/>
             <a:r>
-              <a:rPr lang="it-IT" smtClean="0"/>
+              <a:rPr lang="it-IT"/>
               <a:t>Quarto livello</a:t>
             </a:r>
           </a:p>
           <a:p>
             <a:pPr lvl="4"/>
             <a:r>
-              <a:rPr lang="it-IT" smtClean="0"/>
+              <a:rPr lang="it-IT"/>
               <a:t>Quinto livello</a:t>
             </a:r>
-            <a:endParaRPr lang="it-IT"/>
           </a:p>
         </p:txBody>
       </p:sp>
@@ -1999,38 +2175,37 @@
           <a:p>
             <a:pPr lvl="0"/>
             <a:r>
-              <a:rPr lang="it-IT" smtClean="0"/>
+              <a:rPr lang="it-IT"/>
               <a:t>Fare clic per modificare gli stili del testo dello schema</a:t>
             </a:r>
           </a:p>
           <a:p>
             <a:pPr lvl="1"/>
             <a:r>
-              <a:rPr lang="it-IT" smtClean="0"/>
+              <a:rPr lang="it-IT"/>
               <a:t>Secondo livello</a:t>
             </a:r>
           </a:p>
           <a:p>
             <a:pPr lvl="2"/>
             <a:r>
-              <a:rPr lang="it-IT" smtClean="0"/>
+              <a:rPr lang="it-IT"/>
               <a:t>Terzo livello</a:t>
             </a:r>
           </a:p>
           <a:p>
             <a:pPr lvl="3"/>
             <a:r>
-              <a:rPr lang="it-IT" smtClean="0"/>
+              <a:rPr lang="it-IT"/>
               <a:t>Quarto livello</a:t>
             </a:r>
           </a:p>
           <a:p>
             <a:pPr lvl="4"/>
             <a:r>
-              <a:rPr lang="it-IT" smtClean="0"/>
+              <a:rPr lang="it-IT"/>
               <a:t>Quinto livello</a:t>
             </a:r>
-            <a:endParaRPr lang="it-IT"/>
           </a:p>
         </p:txBody>
       </p:sp>
@@ -2052,7 +2227,7 @@
             <a:fld id="{AD8BF249-6BAC-CD40-AAE9-334F110649E5}" type="datetimeFigureOut">
               <a:rPr lang="it-IT" smtClean="0"/>
               <a:pPr/>
-              <a:t>05/10/2015</a:t>
+              <a:t>24/06/2019</a:t>
             </a:fld>
             <a:endParaRPr lang="it-IT"/>
           </a:p>
@@ -2104,7 +2279,7 @@
     </p:spTree>
     <p:extLst>
       <p:ext uri="{BB962C8B-B14F-4D97-AF65-F5344CB8AC3E}">
-        <p14:creationId xmlns="" xmlns:p14="http://schemas.microsoft.com/office/powerpoint/2010/main" val="1303381961"/>
+        <p14:creationId xmlns:p14="http://schemas.microsoft.com/office/powerpoint/2010/main" val="1303381961"/>
       </p:ext>
     </p:extLst>
   </p:cSld>
@@ -2151,10 +2326,9 @@
           </a:lstStyle>
           <a:p>
             <a:r>
-              <a:rPr lang="it-IT" smtClean="0"/>
+              <a:rPr lang="it-IT"/>
               <a:t>Fare clic per modificare stile</a:t>
             </a:r>
-            <a:endParaRPr lang="it-IT"/>
           </a:p>
         </p:txBody>
       </p:sp>
@@ -2217,7 +2391,7 @@
           <a:p>
             <a:pPr lvl="0"/>
             <a:r>
-              <a:rPr lang="it-IT" smtClean="0"/>
+              <a:rPr lang="it-IT"/>
               <a:t>Fare clic per modificare gli stili del testo dello schema</a:t>
             </a:r>
           </a:p>
@@ -2273,38 +2447,37 @@
           <a:p>
             <a:pPr lvl="0"/>
             <a:r>
-              <a:rPr lang="it-IT" smtClean="0"/>
+              <a:rPr lang="it-IT"/>
               <a:t>Fare clic per modificare gli stili del testo dello schema</a:t>
             </a:r>
           </a:p>
           <a:p>
             <a:pPr lvl="1"/>
             <a:r>
-              <a:rPr lang="it-IT" smtClean="0"/>
+              <a:rPr lang="it-IT"/>
               <a:t>Secondo livello</a:t>
             </a:r>
           </a:p>
           <a:p>
             <a:pPr lvl="2"/>
             <a:r>
-              <a:rPr lang="it-IT" smtClean="0"/>
+              <a:rPr lang="it-IT"/>
               <a:t>Terzo livello</a:t>
             </a:r>
           </a:p>
           <a:p>
             <a:pPr lvl="3"/>
             <a:r>
-              <a:rPr lang="it-IT" smtClean="0"/>
+              <a:rPr lang="it-IT"/>
               <a:t>Quarto livello</a:t>
             </a:r>
           </a:p>
           <a:p>
             <a:pPr lvl="4"/>
             <a:r>
-              <a:rPr lang="it-IT" smtClean="0"/>
+              <a:rPr lang="it-IT"/>
               <a:t>Quinto livello</a:t>
             </a:r>
-            <a:endParaRPr lang="it-IT"/>
           </a:p>
         </p:txBody>
       </p:sp>
@@ -2367,7 +2540,7 @@
           <a:p>
             <a:pPr lvl="0"/>
             <a:r>
-              <a:rPr lang="it-IT" smtClean="0"/>
+              <a:rPr lang="it-IT"/>
               <a:t>Fare clic per modificare gli stili del testo dello schema</a:t>
             </a:r>
           </a:p>
@@ -2423,38 +2596,37 @@
           <a:p>
             <a:pPr lvl="0"/>
             <a:r>
-              <a:rPr lang="it-IT" smtClean="0"/>
+              <a:rPr lang="it-IT"/>
               <a:t>Fare clic per modificare gli stili del testo dello schema</a:t>
             </a:r>
           </a:p>
           <a:p>
             <a:pPr lvl="1"/>
             <a:r>
-              <a:rPr lang="it-IT" smtClean="0"/>
+              <a:rPr lang="it-IT"/>
               <a:t>Secondo livello</a:t>
             </a:r>
           </a:p>
           <a:p>
             <a:pPr lvl="2"/>
             <a:r>
-              <a:rPr lang="it-IT" smtClean="0"/>
+              <a:rPr lang="it-IT"/>
               <a:t>Terzo livello</a:t>
             </a:r>
           </a:p>
           <a:p>
             <a:pPr lvl="3"/>
             <a:r>
-              <a:rPr lang="it-IT" smtClean="0"/>
+              <a:rPr lang="it-IT"/>
               <a:t>Quarto livello</a:t>
             </a:r>
           </a:p>
           <a:p>
             <a:pPr lvl="4"/>
             <a:r>
-              <a:rPr lang="it-IT" smtClean="0"/>
+              <a:rPr lang="it-IT"/>
               <a:t>Quinto livello</a:t>
             </a:r>
-            <a:endParaRPr lang="it-IT"/>
           </a:p>
         </p:txBody>
       </p:sp>
@@ -2476,7 +2648,7 @@
             <a:fld id="{AD8BF249-6BAC-CD40-AAE9-334F110649E5}" type="datetimeFigureOut">
               <a:rPr lang="it-IT" smtClean="0"/>
               <a:pPr/>
-              <a:t>05/10/2015</a:t>
+              <a:t>24/06/2019</a:t>
             </a:fld>
             <a:endParaRPr lang="it-IT"/>
           </a:p>
@@ -2528,7 +2700,7 @@
     </p:spTree>
     <p:extLst>
       <p:ext uri="{BB962C8B-B14F-4D97-AF65-F5344CB8AC3E}">
-        <p14:creationId xmlns="" xmlns:p14="http://schemas.microsoft.com/office/powerpoint/2010/main" val="3469635495"/>
+        <p14:creationId xmlns:p14="http://schemas.microsoft.com/office/powerpoint/2010/main" val="3469635495"/>
       </p:ext>
     </p:extLst>
   </p:cSld>
@@ -2571,10 +2743,9 @@
           <a:lstStyle/>
           <a:p>
             <a:r>
-              <a:rPr lang="it-IT" smtClean="0"/>
+              <a:rPr lang="it-IT"/>
               <a:t>Fare clic per modificare stile</a:t>
             </a:r>
-            <a:endParaRPr lang="it-IT"/>
           </a:p>
         </p:txBody>
       </p:sp>
@@ -2596,7 +2767,7 @@
             <a:fld id="{AD8BF249-6BAC-CD40-AAE9-334F110649E5}" type="datetimeFigureOut">
               <a:rPr lang="it-IT" smtClean="0"/>
               <a:pPr/>
-              <a:t>05/10/2015</a:t>
+              <a:t>24/06/2019</a:t>
             </a:fld>
             <a:endParaRPr lang="it-IT"/>
           </a:p>
@@ -2648,7 +2819,7 @@
     </p:spTree>
     <p:extLst>
       <p:ext uri="{BB962C8B-B14F-4D97-AF65-F5344CB8AC3E}">
-        <p14:creationId xmlns="" xmlns:p14="http://schemas.microsoft.com/office/powerpoint/2010/main" val="1936006007"/>
+        <p14:creationId xmlns:p14="http://schemas.microsoft.com/office/powerpoint/2010/main" val="1936006007"/>
       </p:ext>
     </p:extLst>
   </p:cSld>
@@ -2693,7 +2864,7 @@
             <a:fld id="{AD8BF249-6BAC-CD40-AAE9-334F110649E5}" type="datetimeFigureOut">
               <a:rPr lang="it-IT" smtClean="0"/>
               <a:pPr/>
-              <a:t>05/10/2015</a:t>
+              <a:t>24/06/2019</a:t>
             </a:fld>
             <a:endParaRPr lang="it-IT"/>
           </a:p>
@@ -2745,7 +2916,7 @@
     </p:spTree>
     <p:extLst>
       <p:ext uri="{BB962C8B-B14F-4D97-AF65-F5344CB8AC3E}">
-        <p14:creationId xmlns="" xmlns:p14="http://schemas.microsoft.com/office/powerpoint/2010/main" val="1396321726"/>
+        <p14:creationId xmlns:p14="http://schemas.microsoft.com/office/powerpoint/2010/main" val="1396321726"/>
       </p:ext>
     </p:extLst>
   </p:cSld>
@@ -2797,10 +2968,9 @@
           </a:lstStyle>
           <a:p>
             <a:r>
-              <a:rPr lang="it-IT" smtClean="0"/>
+              <a:rPr lang="it-IT"/>
               <a:t>Fare clic per modificare stile</a:t>
             </a:r>
-            <a:endParaRPr lang="it-IT"/>
           </a:p>
         </p:txBody>
       </p:sp>
@@ -2854,38 +3024,37 @@
           <a:p>
             <a:pPr lvl="0"/>
             <a:r>
-              <a:rPr lang="it-IT" smtClean="0"/>
+              <a:rPr lang="it-IT"/>
               <a:t>Fare clic per modificare gli stili del testo dello schema</a:t>
             </a:r>
           </a:p>
           <a:p>
             <a:pPr lvl="1"/>
             <a:r>
-              <a:rPr lang="it-IT" smtClean="0"/>
+              <a:rPr lang="it-IT"/>
               <a:t>Secondo livello</a:t>
             </a:r>
           </a:p>
           <a:p>
             <a:pPr lvl="2"/>
             <a:r>
-              <a:rPr lang="it-IT" smtClean="0"/>
+              <a:rPr lang="it-IT"/>
               <a:t>Terzo livello</a:t>
             </a:r>
           </a:p>
           <a:p>
             <a:pPr lvl="3"/>
             <a:r>
-              <a:rPr lang="it-IT" smtClean="0"/>
+              <a:rPr lang="it-IT"/>
               <a:t>Quarto livello</a:t>
             </a:r>
           </a:p>
           <a:p>
             <a:pPr lvl="4"/>
             <a:r>
-              <a:rPr lang="it-IT" smtClean="0"/>
+              <a:rPr lang="it-IT"/>
               <a:t>Quinto livello</a:t>
             </a:r>
-            <a:endParaRPr lang="it-IT"/>
           </a:p>
         </p:txBody>
       </p:sp>
@@ -2948,7 +3117,7 @@
           <a:p>
             <a:pPr lvl="0"/>
             <a:r>
-              <a:rPr lang="it-IT" smtClean="0"/>
+              <a:rPr lang="it-IT"/>
               <a:t>Fare clic per modificare gli stili del testo dello schema</a:t>
             </a:r>
           </a:p>
@@ -2972,7 +3141,7 @@
             <a:fld id="{AD8BF249-6BAC-CD40-AAE9-334F110649E5}" type="datetimeFigureOut">
               <a:rPr lang="it-IT" smtClean="0"/>
               <a:pPr/>
-              <a:t>05/10/2015</a:t>
+              <a:t>24/06/2019</a:t>
             </a:fld>
             <a:endParaRPr lang="it-IT"/>
           </a:p>
@@ -3024,7 +3193,7 @@
     </p:spTree>
     <p:extLst>
       <p:ext uri="{BB962C8B-B14F-4D97-AF65-F5344CB8AC3E}">
-        <p14:creationId xmlns="" xmlns:p14="http://schemas.microsoft.com/office/powerpoint/2010/main" val="374890503"/>
+        <p14:creationId xmlns:p14="http://schemas.microsoft.com/office/powerpoint/2010/main" val="374890503"/>
       </p:ext>
     </p:extLst>
   </p:cSld>
@@ -3076,10 +3245,9 @@
           </a:lstStyle>
           <a:p>
             <a:r>
-              <a:rPr lang="it-IT" smtClean="0"/>
+              <a:rPr lang="it-IT"/>
               <a:t>Fare clic per modificare stile</a:t>
             </a:r>
-            <a:endParaRPr lang="it-IT"/>
           </a:p>
         </p:txBody>
       </p:sp>
@@ -3203,7 +3371,7 @@
           <a:p>
             <a:pPr lvl="0"/>
             <a:r>
-              <a:rPr lang="it-IT" smtClean="0"/>
+              <a:rPr lang="it-IT"/>
               <a:t>Fare clic per modificare gli stili del testo dello schema</a:t>
             </a:r>
           </a:p>
@@ -3227,7 +3395,7 @@
             <a:fld id="{AD8BF249-6BAC-CD40-AAE9-334F110649E5}" type="datetimeFigureOut">
               <a:rPr lang="it-IT" smtClean="0"/>
               <a:pPr/>
-              <a:t>05/10/2015</a:t>
+              <a:t>24/06/2019</a:t>
             </a:fld>
             <a:endParaRPr lang="it-IT"/>
           </a:p>
@@ -3279,7 +3447,7 @@
     </p:spTree>
     <p:extLst>
       <p:ext uri="{BB962C8B-B14F-4D97-AF65-F5344CB8AC3E}">
-        <p14:creationId xmlns="" xmlns:p14="http://schemas.microsoft.com/office/powerpoint/2010/main" val="1549643026"/>
+        <p14:creationId xmlns:p14="http://schemas.microsoft.com/office/powerpoint/2010/main" val="1549643026"/>
       </p:ext>
     </p:extLst>
   </p:cSld>
@@ -3337,10 +3505,9 @@
           <a:lstStyle/>
           <a:p>
             <a:r>
-              <a:rPr lang="it-IT" smtClean="0"/>
+              <a:rPr lang="it-IT"/>
               <a:t>Fare clic per modificare stile</a:t>
             </a:r>
-            <a:endParaRPr lang="it-IT"/>
           </a:p>
         </p:txBody>
       </p:sp>
@@ -3371,38 +3538,37 @@
           <a:p>
             <a:pPr lvl="0"/>
             <a:r>
-              <a:rPr lang="it-IT" smtClean="0"/>
+              <a:rPr lang="it-IT"/>
               <a:t>Fare clic per modificare gli stili del testo dello schema</a:t>
             </a:r>
           </a:p>
           <a:p>
             <a:pPr lvl="1"/>
             <a:r>
-              <a:rPr lang="it-IT" smtClean="0"/>
+              <a:rPr lang="it-IT"/>
               <a:t>Secondo livello</a:t>
             </a:r>
           </a:p>
           <a:p>
             <a:pPr lvl="2"/>
             <a:r>
-              <a:rPr lang="it-IT" smtClean="0"/>
+              <a:rPr lang="it-IT"/>
               <a:t>Terzo livello</a:t>
             </a:r>
           </a:p>
           <a:p>
             <a:pPr lvl="3"/>
             <a:r>
-              <a:rPr lang="it-IT" smtClean="0"/>
+              <a:rPr lang="it-IT"/>
               <a:t>Quarto livello</a:t>
             </a:r>
           </a:p>
           <a:p>
             <a:pPr lvl="4"/>
             <a:r>
-              <a:rPr lang="it-IT" smtClean="0"/>
+              <a:rPr lang="it-IT"/>
               <a:t>Quinto livello</a:t>
             </a:r>
-            <a:endParaRPr lang="it-IT"/>
           </a:p>
         </p:txBody>
       </p:sp>
@@ -3442,7 +3608,7 @@
             <a:fld id="{AD8BF249-6BAC-CD40-AAE9-334F110649E5}" type="datetimeFigureOut">
               <a:rPr lang="it-IT" smtClean="0"/>
               <a:pPr/>
-              <a:t>05/10/2015</a:t>
+              <a:t>24/06/2019</a:t>
             </a:fld>
             <a:endParaRPr lang="it-IT"/>
           </a:p>
@@ -3530,7 +3696,7 @@
     </p:spTree>
     <p:extLst>
       <p:ext uri="{BB962C8B-B14F-4D97-AF65-F5344CB8AC3E}">
-        <p14:creationId xmlns="" xmlns:p14="http://schemas.microsoft.com/office/powerpoint/2010/main" val="4237915859"/>
+        <p14:creationId xmlns:p14="http://schemas.microsoft.com/office/powerpoint/2010/main" val="4237915859"/>
       </p:ext>
     </p:extLst>
   </p:cSld>
@@ -3890,22 +4056,9 @@
           <a:p>
             <a:pPr algn="r"/>
             <a:r>
-              <a:rPr lang="it-IT" dirty="0" smtClean="0"/>
-              <a:t>Sottotitolo </a:t>
-            </a:r>
-            <a:r>
-              <a:rPr lang="it-IT" dirty="0" err="1" smtClean="0"/>
-              <a:t>arial</a:t>
-            </a:r>
-            <a:r>
-              <a:rPr lang="it-IT" dirty="0" smtClean="0"/>
-              <a:t> regular 22 </a:t>
-            </a:r>
-            <a:r>
-              <a:rPr lang="it-IT" dirty="0" err="1" smtClean="0"/>
-              <a:t>pt</a:t>
-            </a:r>
-            <a:endParaRPr lang="it-IT" dirty="0"/>
+              <a:rPr lang="it-IT" dirty="0"/>
+              <a:t>Matteo Tortoli</a:t>
+            </a:r>
           </a:p>
         </p:txBody>
       </p:sp>
@@ -3917,8 +4070,8 @@
         </p:nvSpPr>
         <p:spPr>
           <a:xfrm>
-            <a:off x="6170450" y="4590468"/>
-            <a:ext cx="2374067" cy="338554"/>
+            <a:off x="4796503" y="4590468"/>
+            <a:ext cx="3748014" cy="338554"/>
           </a:xfrm>
           <a:prstGeom prst="rect">
             <a:avLst/>
@@ -3933,38 +4086,11 @@
           <a:p>
             <a:pPr algn="r"/>
             <a:r>
-              <a:rPr lang="it-IT" sz="1600" b="1" dirty="0" smtClean="0">
+              <a:rPr lang="it-IT" sz="1600" b="1" dirty="0">
                 <a:latin typeface=""/>
               </a:rPr>
-              <a:t>Relatore/i </a:t>
-            </a:r>
-            <a:r>
-              <a:rPr lang="it-IT" sz="1600" b="1" dirty="0" err="1" smtClean="0">
-                <a:latin typeface=""/>
-              </a:rPr>
-              <a:t>arial</a:t>
-            </a:r>
-            <a:r>
-              <a:rPr lang="it-IT" sz="1600" b="1" dirty="0" smtClean="0">
-                <a:latin typeface=""/>
-              </a:rPr>
-              <a:t> </a:t>
-            </a:r>
-            <a:r>
-              <a:rPr lang="it-IT" sz="1600" b="1" dirty="0" err="1" smtClean="0">
-                <a:latin typeface=""/>
-              </a:rPr>
-              <a:t>bold</a:t>
-            </a:r>
-            <a:r>
-              <a:rPr lang="it-IT" sz="1600" b="1" dirty="0" smtClean="0">
-                <a:latin typeface=""/>
-              </a:rPr>
-              <a:t> 16 </a:t>
-            </a:r>
-            <a:endParaRPr lang="it-IT" sz="1600" b="1" dirty="0">
-              <a:latin typeface=""/>
-            </a:endParaRPr>
+              <a:t>Relatrice Prof.ssa Maria Cecilia Verri</a:t>
+            </a:r>
           </a:p>
         </p:txBody>
       </p:sp>
@@ -3976,8 +4102,8 @@
         </p:nvSpPr>
         <p:spPr>
           <a:xfrm>
-            <a:off x="6166853" y="6474363"/>
-            <a:ext cx="2260993" cy="307777"/>
+            <a:off x="6433389" y="6474363"/>
+            <a:ext cx="1994457" cy="307777"/>
           </a:xfrm>
           <a:prstGeom prst="rect">
             <a:avLst/>
@@ -3992,7 +4118,7 @@
           <a:p>
             <a:pPr algn="r"/>
             <a:r>
-              <a:rPr lang="it-IT" sz="1400" dirty="0" smtClean="0">
+              <a:rPr lang="it-IT" sz="1400" dirty="0">
                 <a:ln w="18415" cmpd="sng">
                   <a:solidFill>
                     <a:srgbClr val="FFFFFF"/>
@@ -4011,115 +4137,8 @@
                 </a:effectLst>
                 <a:latin typeface=""/>
               </a:rPr>
-              <a:t>Luogo e data </a:t>
-            </a:r>
-            <a:r>
-              <a:rPr lang="it-IT" sz="1400" dirty="0" err="1" smtClean="0">
-                <a:ln w="18415" cmpd="sng">
-                  <a:solidFill>
-                    <a:srgbClr val="FFFFFF"/>
-                  </a:solidFill>
-                  <a:prstDash val="solid"/>
-                </a:ln>
-                <a:solidFill>
-                  <a:srgbClr val="FFFFFF"/>
-                </a:solidFill>
-                <a:effectLst>
-                  <a:outerShdw blurRad="63500" dir="3600000" algn="tl" rotWithShape="0">
-                    <a:srgbClr val="000000">
-                      <a:alpha val="70000"/>
-                    </a:srgbClr>
-                  </a:outerShdw>
-                </a:effectLst>
-                <a:latin typeface=""/>
-              </a:rPr>
-              <a:t>arial</a:t>
-            </a:r>
-            <a:r>
-              <a:rPr lang="it-IT" sz="1400" dirty="0" smtClean="0">
-                <a:ln w="18415" cmpd="sng">
-                  <a:solidFill>
-                    <a:srgbClr val="FFFFFF"/>
-                  </a:solidFill>
-                  <a:prstDash val="solid"/>
-                </a:ln>
-                <a:solidFill>
-                  <a:srgbClr val="FFFFFF"/>
-                </a:solidFill>
-                <a:effectLst>
-                  <a:outerShdw blurRad="63500" dir="3600000" algn="tl" rotWithShape="0">
-                    <a:srgbClr val="000000">
-                      <a:alpha val="70000"/>
-                    </a:srgbClr>
-                  </a:outerShdw>
-                </a:effectLst>
-                <a:latin typeface=""/>
-              </a:rPr>
-              <a:t> </a:t>
-            </a:r>
-            <a:r>
-              <a:rPr lang="it-IT" sz="1400" dirty="0" err="1" smtClean="0">
-                <a:ln w="18415" cmpd="sng">
-                  <a:solidFill>
-                    <a:srgbClr val="FFFFFF"/>
-                  </a:solidFill>
-                  <a:prstDash val="solid"/>
-                </a:ln>
-                <a:solidFill>
-                  <a:srgbClr val="FFFFFF"/>
-                </a:solidFill>
-                <a:effectLst>
-                  <a:outerShdw blurRad="63500" dir="3600000" algn="tl" rotWithShape="0">
-                    <a:srgbClr val="000000">
-                      <a:alpha val="70000"/>
-                    </a:srgbClr>
-                  </a:outerShdw>
-                </a:effectLst>
-                <a:latin typeface=""/>
-              </a:rPr>
-              <a:t>bold</a:t>
-            </a:r>
-            <a:r>
-              <a:rPr lang="it-IT" sz="1400" dirty="0" smtClean="0">
-                <a:ln w="18415" cmpd="sng">
-                  <a:solidFill>
-                    <a:srgbClr val="FFFFFF"/>
-                  </a:solidFill>
-                  <a:prstDash val="solid"/>
-                </a:ln>
-                <a:solidFill>
-                  <a:srgbClr val="FFFFFF"/>
-                </a:solidFill>
-                <a:effectLst>
-                  <a:outerShdw blurRad="63500" dir="3600000" algn="tl" rotWithShape="0">
-                    <a:srgbClr val="000000">
-                      <a:alpha val="70000"/>
-                    </a:srgbClr>
-                  </a:outerShdw>
-                </a:effectLst>
-                <a:latin typeface=""/>
-              </a:rPr>
-              <a:t> 14</a:t>
-            </a:r>
-            <a:endParaRPr lang="it-IT" sz="1400" dirty="0">
-              <a:ln w="18415" cmpd="sng">
-                <a:solidFill>
-                  <a:srgbClr val="FFFFFF"/>
-                </a:solidFill>
-                <a:prstDash val="solid"/>
-              </a:ln>
-              <a:solidFill>
-                <a:srgbClr val="FFFFFF"/>
-              </a:solidFill>
-              <a:effectLst>
-                <a:outerShdw blurRad="63500" dir="3600000" algn="tl" rotWithShape="0">
-                  <a:srgbClr val="000000">
-                    <a:alpha val="70000"/>
-                  </a:srgbClr>
-                </a:outerShdw>
-              </a:effectLst>
-              <a:latin typeface=""/>
-            </a:endParaRPr>
+              <a:t>Firenze, 12 luglio 2019</a:t>
+            </a:r>
           </a:p>
         </p:txBody>
       </p:sp>
@@ -4131,8 +4150,8 @@
         </p:nvSpPr>
         <p:spPr>
           <a:xfrm>
-            <a:off x="4132793" y="2339173"/>
-            <a:ext cx="4411724" cy="584776"/>
+            <a:off x="4016122" y="870433"/>
+            <a:ext cx="4411724" cy="2062103"/>
           </a:xfrm>
           <a:prstGeom prst="rect">
             <a:avLst/>
@@ -4147,7 +4166,7 @@
           <a:p>
             <a:pPr algn="r"/>
             <a:r>
-              <a:rPr lang="it-IT" sz="3200" b="1" dirty="0" smtClean="0">
+              <a:rPr lang="it-IT" sz="3200" b="1" dirty="0">
                 <a:solidFill>
                   <a:schemeClr val="accent1">
                     <a:lumMod val="75000"/>
@@ -4155,10 +4174,10 @@
                 </a:solidFill>
                 <a:latin typeface=""/>
               </a:rPr>
-              <a:t>Titolo </a:t>
-            </a:r>
-            <a:r>
-              <a:rPr lang="it-IT" sz="3200" b="1" dirty="0" err="1" smtClean="0">
+              <a:t>Applicazioni dell’algoritmica </a:t>
+            </a:r>
+            <a:br>
+              <a:rPr lang="it-IT" sz="3200" b="1" dirty="0">
                 <a:solidFill>
                   <a:schemeClr val="accent1">
                     <a:lumMod val="75000"/>
@@ -4166,10 +4185,9 @@
                 </a:solidFill>
                 <a:latin typeface=""/>
               </a:rPr>
-              <a:t>arial</a:t>
-            </a:r>
-            <a:r>
-              <a:rPr lang="it-IT" sz="3200" b="1" dirty="0" smtClean="0">
+            </a:br>
+            <a:r>
+              <a:rPr lang="it-IT" sz="3200" b="1" dirty="0">
                 <a:solidFill>
                   <a:schemeClr val="accent1">
                     <a:lumMod val="75000"/>
@@ -4177,10 +4195,10 @@
                 </a:solidFill>
                 <a:latin typeface=""/>
               </a:rPr>
-              <a:t> </a:t>
-            </a:r>
-            <a:r>
-              <a:rPr lang="it-IT" sz="3200" b="1" dirty="0" err="1" smtClean="0">
+              <a:t>alla biologia: </a:t>
+            </a:r>
+            <a:br>
+              <a:rPr lang="it-IT" sz="3200" b="1" dirty="0">
                 <a:solidFill>
                   <a:schemeClr val="accent1">
                     <a:lumMod val="75000"/>
@@ -4188,10 +4206,9 @@
                 </a:solidFill>
                 <a:latin typeface=""/>
               </a:rPr>
-              <a:t>bold</a:t>
-            </a:r>
-            <a:r>
-              <a:rPr lang="it-IT" sz="3200" b="1" dirty="0" smtClean="0">
+            </a:br>
+            <a:r>
+              <a:rPr lang="it-IT" sz="3200" b="1" dirty="0">
                 <a:solidFill>
                   <a:schemeClr val="accent1">
                     <a:lumMod val="75000"/>
@@ -4199,34 +4216,15 @@
                 </a:solidFill>
                 <a:latin typeface=""/>
               </a:rPr>
-              <a:t> 32 </a:t>
-            </a:r>
-            <a:r>
-              <a:rPr lang="it-IT" sz="3200" b="1" dirty="0" err="1" smtClean="0">
-                <a:solidFill>
-                  <a:schemeClr val="accent1">
-                    <a:lumMod val="75000"/>
-                  </a:schemeClr>
-                </a:solidFill>
-                <a:latin typeface=""/>
-              </a:rPr>
-              <a:t>pt</a:t>
-            </a:r>
-            <a:endParaRPr lang="it-IT" sz="3200" b="1" dirty="0">
-              <a:solidFill>
-                <a:schemeClr val="accent1">
-                  <a:lumMod val="75000"/>
-                </a:schemeClr>
-              </a:solidFill>
-              <a:latin typeface=""/>
-            </a:endParaRPr>
+              <a:t>alberi evolutivi</a:t>
+            </a:r>
           </a:p>
         </p:txBody>
       </p:sp>
     </p:spTree>
     <p:extLst>
       <p:ext uri="{BB962C8B-B14F-4D97-AF65-F5344CB8AC3E}">
-        <p14:creationId xmlns="" xmlns:p14="http://schemas.microsoft.com/office/powerpoint/2010/main" val="3311714463"/>
+        <p14:creationId xmlns:p14="http://schemas.microsoft.com/office/powerpoint/2010/main" val="3311714463"/>
       </p:ext>
     </p:extLst>
   </p:cSld>
@@ -4300,7 +4298,7 @@
           <a:lstStyle/>
           <a:p>
             <a:r>
-              <a:rPr lang="it-IT" sz="2400" b="1" dirty="0" smtClean="0">
+              <a:rPr lang="it-IT" sz="2400" b="1" dirty="0">
                 <a:solidFill>
                   <a:schemeClr val="accent1">
                     <a:lumMod val="75000"/>
@@ -4312,7 +4310,7 @@
               <a:t>Titolo </a:t>
             </a:r>
             <a:r>
-              <a:rPr lang="it-IT" sz="2400" b="1" dirty="0" err="1" smtClean="0">
+              <a:rPr lang="it-IT" sz="2400" b="1" dirty="0" err="1">
                 <a:solidFill>
                   <a:schemeClr val="accent1">
                     <a:lumMod val="75000"/>
@@ -4324,7 +4322,7 @@
               <a:t>arial</a:t>
             </a:r>
             <a:r>
-              <a:rPr lang="it-IT" sz="2400" b="1" dirty="0" smtClean="0">
+              <a:rPr lang="it-IT" sz="2400" b="1" dirty="0">
                 <a:solidFill>
                   <a:schemeClr val="accent1">
                     <a:lumMod val="75000"/>
@@ -4336,7 +4334,7 @@
               <a:t> </a:t>
             </a:r>
             <a:r>
-              <a:rPr lang="it-IT" sz="2400" b="1" dirty="0" err="1" smtClean="0">
+              <a:rPr lang="it-IT" sz="2400" b="1" dirty="0" err="1">
                 <a:solidFill>
                   <a:schemeClr val="accent1">
                     <a:lumMod val="75000"/>
@@ -4348,7 +4346,7 @@
               <a:t>bold</a:t>
             </a:r>
             <a:r>
-              <a:rPr lang="it-IT" sz="2400" b="1" dirty="0" smtClean="0">
+              <a:rPr lang="it-IT" sz="2400" b="1" dirty="0">
                 <a:solidFill>
                   <a:schemeClr val="accent1">
                     <a:lumMod val="75000"/>
@@ -4360,7 +4358,7 @@
               <a:t> 24 </a:t>
             </a:r>
             <a:r>
-              <a:rPr lang="it-IT" sz="2400" b="1" dirty="0" err="1" smtClean="0">
+              <a:rPr lang="it-IT" sz="2400" b="1" dirty="0" err="1">
                 <a:solidFill>
                   <a:schemeClr val="accent1">
                     <a:lumMod val="75000"/>
@@ -4406,28 +4404,28 @@
           <a:lstStyle/>
           <a:p>
             <a:r>
-              <a:rPr lang="it-IT" dirty="0" smtClean="0">
+              <a:rPr lang="it-IT" dirty="0">
                 <a:latin typeface="Arial"/>
                 <a:cs typeface="Arial"/>
               </a:rPr>
               <a:t>Sottotitolo </a:t>
             </a:r>
             <a:r>
-              <a:rPr lang="it-IT" dirty="0" err="1" smtClean="0">
+              <a:rPr lang="it-IT" dirty="0" err="1">
                 <a:latin typeface="Arial"/>
                 <a:cs typeface="Arial"/>
               </a:rPr>
               <a:t>arial</a:t>
             </a:r>
             <a:r>
-              <a:rPr lang="it-IT" dirty="0" smtClean="0">
+              <a:rPr lang="it-IT" dirty="0">
                 <a:latin typeface="Arial"/>
                 <a:cs typeface="Arial"/>
               </a:rPr>
               <a:t> regular 18 </a:t>
             </a:r>
             <a:r>
-              <a:rPr lang="it-IT" dirty="0" err="1" smtClean="0">
+              <a:rPr lang="it-IT" dirty="0" err="1">
                 <a:latin typeface="Arial"/>
                 <a:cs typeface="Arial"/>
               </a:rPr>
@@ -4464,26 +4462,6 @@
           <a:p>
             <a:pPr algn="just"/>
             <a:r>
-              <a:rPr lang="it-IT" sz="1400" dirty="0" smtClean="0"/>
-              <a:t>Esempio di slide solo testo </a:t>
-            </a:r>
-            <a:r>
-              <a:rPr lang="it-IT" sz="1400" dirty="0" err="1" smtClean="0"/>
-              <a:t>arial</a:t>
-            </a:r>
-            <a:r>
-              <a:rPr lang="it-IT" sz="1400" dirty="0" smtClean="0"/>
-              <a:t> regular 14 </a:t>
-            </a:r>
-            <a:r>
-              <a:rPr lang="it-IT" sz="1400" dirty="0" err="1" smtClean="0"/>
-              <a:t>pt</a:t>
-            </a:r>
-            <a:r>
-              <a:rPr lang="it-IT" sz="1400" dirty="0" smtClean="0"/>
-              <a:t> allineamento a sinistra o giustificato </a:t>
-            </a:r>
-            <a:r>
               <a:rPr lang="it-IT" sz="1400" dirty="0"/>
               <a:t>Esempio di slide solo testo </a:t>
             </a:r>
@@ -4501,15 +4479,7 @@
             </a:r>
             <a:r>
               <a:rPr lang="it-IT" sz="1400" dirty="0"/>
-              <a:t> allineamento a sinistra o </a:t>
-            </a:r>
-            <a:r>
-              <a:rPr lang="it-IT" sz="1400" dirty="0" smtClean="0"/>
-              <a:t>giustificato </a:t>
-            </a:r>
-            <a:r>
-              <a:rPr lang="it-IT" sz="1400" dirty="0"/>
-              <a:t>Esempio di slide solo testo </a:t>
+              <a:t> allineamento a sinistra o giustificato Esempio di slide solo testo </a:t>
             </a:r>
             <a:r>
               <a:rPr lang="it-IT" sz="1400" dirty="0" err="1"/>
@@ -4541,15 +4511,7 @@
             </a:r>
             <a:r>
               <a:rPr lang="it-IT" sz="1400" dirty="0"/>
-              <a:t> allineamento a sinistra o </a:t>
-            </a:r>
-            <a:r>
-              <a:rPr lang="it-IT" sz="1400" dirty="0" smtClean="0"/>
-              <a:t>giustificato </a:t>
-            </a:r>
-            <a:r>
-              <a:rPr lang="it-IT" sz="1400" dirty="0"/>
-              <a:t>Esempio di slide solo testo </a:t>
+              <a:t> allineamento a sinistra o giustificato Esempio di slide solo testo </a:t>
             </a:r>
             <a:r>
               <a:rPr lang="it-IT" sz="1400" dirty="0" err="1"/>
@@ -4581,32 +4543,45 @@
             </a:r>
             <a:r>
               <a:rPr lang="it-IT" sz="1400" dirty="0"/>
+              <a:t> allineamento a sinistra o giustificato Esempio di slide solo testo </a:t>
+            </a:r>
+            <a:r>
+              <a:rPr lang="it-IT" sz="1400" dirty="0" err="1"/>
+              <a:t>arial</a:t>
+            </a:r>
+            <a:r>
+              <a:rPr lang="it-IT" sz="1400" dirty="0"/>
+              <a:t> regular 14 </a:t>
+            </a:r>
+            <a:r>
+              <a:rPr lang="it-IT" sz="1400" dirty="0" err="1"/>
+              <a:t>pt</a:t>
+            </a:r>
+            <a:r>
+              <a:rPr lang="it-IT" sz="1400" dirty="0"/>
               <a:t> allineamento a sinistra o giustificato           </a:t>
             </a:r>
           </a:p>
           <a:p>
             <a:pPr algn="just"/>
             <a:r>
-              <a:rPr lang="it-IT" sz="1400" dirty="0" smtClean="0"/>
+              <a:rPr lang="it-IT" sz="1400" dirty="0"/>
               <a:t>           </a:t>
             </a:r>
-            <a:endParaRPr lang="it-IT" sz="1400" dirty="0"/>
           </a:p>
           <a:p>
             <a:pPr algn="just"/>
             <a:r>
-              <a:rPr lang="it-IT" sz="1400" dirty="0" smtClean="0"/>
+              <a:rPr lang="it-IT" sz="1400" dirty="0"/>
               <a:t>           </a:t>
             </a:r>
-            <a:endParaRPr lang="it-IT" sz="1400" dirty="0"/>
           </a:p>
           <a:p>
             <a:pPr algn="just"/>
             <a:r>
-              <a:rPr lang="it-IT" sz="1400" dirty="0" smtClean="0"/>
+              <a:rPr lang="it-IT" sz="1400" dirty="0"/>
               <a:t>           </a:t>
             </a:r>
-            <a:endParaRPr lang="it-IT" sz="1400" dirty="0"/>
           </a:p>
         </p:txBody>
       </p:sp>
@@ -4704,8 +4679,8 @@
         </p:nvSpPr>
         <p:spPr>
           <a:xfrm>
-            <a:off x="7508873" y="51433"/>
-            <a:ext cx="1184940" cy="338554"/>
+            <a:off x="5735951" y="51433"/>
+            <a:ext cx="2957862" cy="215444"/>
           </a:xfrm>
           <a:prstGeom prst="rect">
             <a:avLst/>
@@ -4720,75 +4695,15 @@
           <a:p>
             <a:pPr algn="r"/>
             <a:r>
-              <a:rPr lang="it-IT" sz="800" b="1" dirty="0" smtClean="0">
+              <a:rPr lang="it-IT" sz="800" b="1" dirty="0">
                 <a:solidFill>
                   <a:schemeClr val="bg1"/>
                 </a:solidFill>
                 <a:latin typeface="Arial"/>
                 <a:cs typeface="Arial"/>
               </a:rPr>
-              <a:t>Titolo presentazione </a:t>
-            </a:r>
-          </a:p>
-          <a:p>
-            <a:pPr algn="r"/>
-            <a:r>
-              <a:rPr lang="it-IT" sz="800" b="1" dirty="0" err="1" smtClean="0">
-                <a:solidFill>
-                  <a:schemeClr val="bg1"/>
-                </a:solidFill>
-                <a:latin typeface="Arial"/>
-                <a:cs typeface="Arial"/>
-              </a:rPr>
-              <a:t>arial</a:t>
-            </a:r>
-            <a:r>
-              <a:rPr lang="it-IT" sz="800" b="1" dirty="0" smtClean="0">
-                <a:solidFill>
-                  <a:schemeClr val="bg1"/>
-                </a:solidFill>
-                <a:latin typeface="Arial"/>
-                <a:cs typeface="Arial"/>
-              </a:rPr>
-              <a:t> </a:t>
-            </a:r>
-            <a:r>
-              <a:rPr lang="it-IT" sz="800" b="1" dirty="0" err="1" smtClean="0">
-                <a:solidFill>
-                  <a:schemeClr val="bg1"/>
-                </a:solidFill>
-                <a:latin typeface="Arial"/>
-                <a:cs typeface="Arial"/>
-              </a:rPr>
-              <a:t>bold</a:t>
-            </a:r>
-            <a:r>
-              <a:rPr lang="it-IT" sz="800" b="1" dirty="0" smtClean="0">
-                <a:solidFill>
-                  <a:schemeClr val="bg1"/>
-                </a:solidFill>
-                <a:latin typeface="Arial"/>
-                <a:cs typeface="Arial"/>
-              </a:rPr>
-              <a:t> 8 </a:t>
-            </a:r>
-            <a:r>
-              <a:rPr lang="it-IT" sz="800" b="1" dirty="0" err="1" smtClean="0">
-                <a:solidFill>
-                  <a:schemeClr val="bg1"/>
-                </a:solidFill>
-                <a:latin typeface="Arial"/>
-                <a:cs typeface="Arial"/>
-              </a:rPr>
-              <a:t>pt</a:t>
-            </a:r>
-            <a:endParaRPr lang="it-IT" sz="800" b="1" dirty="0">
-              <a:solidFill>
-                <a:schemeClr val="bg1"/>
-              </a:solidFill>
-              <a:latin typeface="Arial"/>
-              <a:cs typeface="Arial"/>
-            </a:endParaRPr>
+              <a:t>Applicazioni dell’algoritmica alla biologia: alberi evolutivi</a:t>
+            </a:r>
           </a:p>
         </p:txBody>
       </p:sp>
@@ -4816,52 +4731,15 @@
           <a:p>
             <a:pPr algn="r"/>
             <a:r>
-              <a:rPr lang="it-IT" sz="800" dirty="0" smtClean="0">
+              <a:rPr lang="it-IT" sz="800" dirty="0">
                 <a:solidFill>
                   <a:schemeClr val="bg1"/>
                 </a:solidFill>
                 <a:latin typeface="Arial"/>
                 <a:cs typeface="Arial"/>
               </a:rPr>
-              <a:t>Luogo e data </a:t>
-            </a:r>
-            <a:r>
-              <a:rPr lang="it-IT" sz="800" dirty="0" err="1" smtClean="0">
-                <a:solidFill>
-                  <a:schemeClr val="bg1"/>
-                </a:solidFill>
-                <a:latin typeface="Arial"/>
-                <a:cs typeface="Arial"/>
-              </a:rPr>
-              <a:t>arial</a:t>
-            </a:r>
-            <a:r>
-              <a:rPr lang="it-IT" sz="800" dirty="0" smtClean="0">
-                <a:solidFill>
-                  <a:schemeClr val="bg1"/>
-                </a:solidFill>
-                <a:latin typeface="Arial"/>
-                <a:cs typeface="Arial"/>
-              </a:rPr>
-              <a:t> regular 8 </a:t>
-            </a:r>
-            <a:r>
-              <a:rPr lang="it-IT" sz="800" dirty="0" err="1" smtClean="0">
-                <a:solidFill>
-                  <a:schemeClr val="bg1"/>
-                </a:solidFill>
-                <a:latin typeface="Arial"/>
-                <a:cs typeface="Arial"/>
-              </a:rPr>
-              <a:t>pt</a:t>
-            </a:r>
-            <a:endParaRPr lang="it-IT" sz="800" dirty="0" smtClean="0">
-              <a:solidFill>
-                <a:schemeClr val="bg1"/>
-              </a:solidFill>
-              <a:latin typeface="Arial"/>
-              <a:cs typeface="Arial"/>
-            </a:endParaRPr>
+              <a:t>Firenze, 12 luglio 2019</a:t>
+            </a:r>
           </a:p>
           <a:p>
             <a:endParaRPr lang="it-IT" dirty="0"/>
@@ -4871,7 +4749,7 @@
     </p:spTree>
     <p:extLst>
       <p:ext uri="{BB962C8B-B14F-4D97-AF65-F5344CB8AC3E}">
-        <p14:creationId xmlns="" xmlns:p14="http://schemas.microsoft.com/office/powerpoint/2010/main" val="3016431194"/>
+        <p14:creationId xmlns:p14="http://schemas.microsoft.com/office/powerpoint/2010/main" val="3016431194"/>
       </p:ext>
     </p:extLst>
   </p:cSld>
@@ -4934,7 +4812,7 @@
           <a:blip r:embed="rId4">
             <a:extLst>
               <a:ext uri="{28A0092B-C50C-407E-A947-70E740481C1C}">
-                <a14:useLocalDpi xmlns="" xmlns:a14="http://schemas.microsoft.com/office/drawing/2010/main" val="0"/>
+                <a14:useLocalDpi xmlns:a14="http://schemas.microsoft.com/office/drawing/2010/main" val="0"/>
               </a:ext>
             </a:extLst>
           </a:blip>
@@ -4976,46 +4854,39 @@
           <a:p>
             <a:pPr algn="just"/>
             <a:r>
-              <a:rPr lang="it-IT" sz="1200" dirty="0" smtClean="0">
+              <a:rPr lang="it-IT" sz="1200" dirty="0">
                 <a:latin typeface="Arial"/>
                 <a:cs typeface="Arial"/>
               </a:rPr>
               <a:t>didascalia </a:t>
             </a:r>
             <a:r>
-              <a:rPr lang="it-IT" sz="1200" dirty="0" err="1" smtClean="0">
+              <a:rPr lang="it-IT" sz="1200" dirty="0" err="1">
                 <a:latin typeface="Arial"/>
                 <a:cs typeface="Arial"/>
               </a:rPr>
               <a:t>arial</a:t>
             </a:r>
             <a:r>
-              <a:rPr lang="it-IT" sz="1200" dirty="0" smtClean="0">
+              <a:rPr lang="it-IT" sz="1200" dirty="0">
                 <a:latin typeface="Arial"/>
                 <a:cs typeface="Arial"/>
               </a:rPr>
               <a:t> regular 12 </a:t>
             </a:r>
             <a:r>
-              <a:rPr lang="it-IT" sz="1200" dirty="0" err="1" smtClean="0">
+              <a:rPr lang="it-IT" sz="1200" dirty="0" err="1">
                 <a:latin typeface="Arial"/>
                 <a:cs typeface="Arial"/>
               </a:rPr>
               <a:t>pt</a:t>
             </a:r>
             <a:r>
-              <a:rPr lang="it-IT" sz="1200" dirty="0" smtClean="0">
-                <a:latin typeface="Arial"/>
-                <a:cs typeface="Arial"/>
-              </a:rPr>
-              <a:t> allineamento a sinistra o giustificato </a:t>
-            </a:r>
-            <a:r>
               <a:rPr lang="it-IT" sz="1200" dirty="0">
                 <a:latin typeface="Arial"/>
                 <a:cs typeface="Arial"/>
               </a:rPr>
-              <a:t>didascalia </a:t>
+              <a:t> allineamento a sinistra o giustificato didascalia </a:t>
             </a:r>
             <a:r>
               <a:rPr lang="it-IT" sz="1200" dirty="0" err="1">
@@ -5043,77 +4914,50 @@
                 <a:latin typeface="Arial"/>
                 <a:cs typeface="Arial"/>
               </a:rPr>
-              <a:t> allineamento a sinistra o </a:t>
-            </a:r>
-            <a:r>
-              <a:rPr lang="it-IT" sz="1200" dirty="0" smtClean="0">
-                <a:latin typeface="Arial"/>
-                <a:cs typeface="Arial"/>
-              </a:rPr>
-              <a:t>giustificato </a:t>
+              <a:t> allineamento a sinistra o giustificato didascalia </a:t>
+            </a:r>
+            <a:r>
+              <a:rPr lang="it-IT" sz="1200" dirty="0" err="1">
+                <a:latin typeface="Arial"/>
+                <a:cs typeface="Arial"/>
+              </a:rPr>
+              <a:t>arial</a:t>
             </a:r>
             <a:r>
               <a:rPr lang="it-IT" sz="1200" dirty="0">
                 <a:latin typeface="Arial"/>
                 <a:cs typeface="Arial"/>
               </a:rPr>
-              <a:t>didascalia </a:t>
+              <a:t> regular 12 </a:t>
             </a:r>
             <a:r>
               <a:rPr lang="it-IT" sz="1200" dirty="0" err="1">
                 <a:latin typeface="Arial"/>
                 <a:cs typeface="Arial"/>
               </a:rPr>
-              <a:t>arial</a:t>
+              <a:t>pt</a:t>
             </a:r>
             <a:r>
               <a:rPr lang="it-IT" sz="1200" dirty="0">
                 <a:latin typeface="Arial"/>
                 <a:cs typeface="Arial"/>
               </a:rPr>
-              <a:t> regular 12 </a:t>
-            </a:r>
-            <a:r>
-              <a:rPr lang="it-IT" sz="1200" dirty="0" err="1">
-                <a:latin typeface="Arial"/>
-                <a:cs typeface="Arial"/>
-              </a:rPr>
-              <a:t>pt</a:t>
-            </a:r>
-            <a:r>
-              <a:rPr lang="it-IT" sz="1200" dirty="0">
-                <a:latin typeface="Arial"/>
-                <a:cs typeface="Arial"/>
-              </a:rPr>
-              <a:t> allineamento a sinistra o </a:t>
-            </a:r>
-            <a:r>
-              <a:rPr lang="it-IT" sz="1200" dirty="0" smtClean="0">
-                <a:latin typeface="Arial"/>
-                <a:cs typeface="Arial"/>
-              </a:rPr>
-              <a:t>giustificato</a:t>
-            </a:r>
-            <a:endParaRPr lang="it-IT" sz="1200" dirty="0">
-              <a:latin typeface="Arial"/>
-              <a:cs typeface="Arial"/>
-            </a:endParaRPr>
+              <a:t> allineamento a sinistra o giustificato</a:t>
+            </a:r>
           </a:p>
           <a:p>
             <a:pPr algn="just"/>
             <a:r>
-              <a:rPr lang="it-IT" sz="1400" dirty="0" smtClean="0"/>
+              <a:rPr lang="it-IT" sz="1400" dirty="0"/>
               <a:t>           </a:t>
             </a:r>
-            <a:endParaRPr lang="it-IT" sz="1400" dirty="0"/>
           </a:p>
           <a:p>
             <a:pPr algn="just"/>
             <a:r>
-              <a:rPr lang="it-IT" sz="1400" dirty="0" smtClean="0"/>
+              <a:rPr lang="it-IT" sz="1400" dirty="0"/>
               <a:t>           </a:t>
             </a:r>
-            <a:endParaRPr lang="it-IT" sz="1400" dirty="0"/>
           </a:p>
         </p:txBody>
       </p:sp>
@@ -5227,7 +5071,7 @@
           <a:p>
             <a:pPr algn="r"/>
             <a:r>
-              <a:rPr lang="it-IT" sz="800" b="1" dirty="0" smtClean="0">
+              <a:rPr lang="it-IT" sz="800" b="1" dirty="0">
                 <a:solidFill>
                   <a:schemeClr val="bg1"/>
                 </a:solidFill>
@@ -5240,7 +5084,7 @@
           <a:p>
             <a:pPr algn="r"/>
             <a:r>
-              <a:rPr lang="it-IT" sz="800" b="1" dirty="0" err="1" smtClean="0">
+              <a:rPr lang="it-IT" sz="800" b="1" dirty="0" err="1">
                 <a:solidFill>
                   <a:schemeClr val="bg1"/>
                 </a:solidFill>
@@ -5250,7 +5094,7 @@
               <a:t>arial</a:t>
             </a:r>
             <a:r>
-              <a:rPr lang="it-IT" sz="800" b="1" dirty="0" smtClean="0">
+              <a:rPr lang="it-IT" sz="800" b="1" dirty="0">
                 <a:solidFill>
                   <a:schemeClr val="bg1"/>
                 </a:solidFill>
@@ -5260,7 +5104,7 @@
               <a:t> </a:t>
             </a:r>
             <a:r>
-              <a:rPr lang="it-IT" sz="800" b="1" dirty="0" err="1" smtClean="0">
+              <a:rPr lang="it-IT" sz="800" b="1" dirty="0" err="1">
                 <a:solidFill>
                   <a:schemeClr val="bg1"/>
                 </a:solidFill>
@@ -5270,7 +5114,7 @@
               <a:t>bold</a:t>
             </a:r>
             <a:r>
-              <a:rPr lang="it-IT" sz="800" b="1" dirty="0" smtClean="0">
+              <a:rPr lang="it-IT" sz="800" b="1" dirty="0">
                 <a:solidFill>
                   <a:schemeClr val="bg1"/>
                 </a:solidFill>
@@ -5280,7 +5124,7 @@
               <a:t> 8 </a:t>
             </a:r>
             <a:r>
-              <a:rPr lang="it-IT" sz="800" b="1" dirty="0" err="1" smtClean="0">
+              <a:rPr lang="it-IT" sz="800" b="1" dirty="0" err="1">
                 <a:solidFill>
                   <a:schemeClr val="bg1"/>
                 </a:solidFill>
@@ -5323,7 +5167,7 @@
           <a:p>
             <a:pPr algn="r"/>
             <a:r>
-              <a:rPr lang="it-IT" sz="800" dirty="0" smtClean="0">
+              <a:rPr lang="it-IT" sz="800" dirty="0">
                 <a:solidFill>
                   <a:schemeClr val="bg1"/>
                 </a:solidFill>
@@ -5333,7 +5177,7 @@
               <a:t>Luogo e data </a:t>
             </a:r>
             <a:r>
-              <a:rPr lang="it-IT" sz="800" dirty="0" err="1" smtClean="0">
+              <a:rPr lang="it-IT" sz="800" dirty="0" err="1">
                 <a:solidFill>
                   <a:schemeClr val="bg1"/>
                 </a:solidFill>
@@ -5343,7 +5187,7 @@
               <a:t>arial</a:t>
             </a:r>
             <a:r>
-              <a:rPr lang="it-IT" sz="800" dirty="0" smtClean="0">
+              <a:rPr lang="it-IT" sz="800" dirty="0">
                 <a:solidFill>
                   <a:schemeClr val="bg1"/>
                 </a:solidFill>
@@ -5353,7 +5197,7 @@
               <a:t> regular 8 </a:t>
             </a:r>
             <a:r>
-              <a:rPr lang="it-IT" sz="800" dirty="0" err="1" smtClean="0">
+              <a:rPr lang="it-IT" sz="800" dirty="0" err="1">
                 <a:solidFill>
                   <a:schemeClr val="bg1"/>
                 </a:solidFill>
@@ -5362,7 +5206,7 @@
               </a:rPr>
               <a:t>pt</a:t>
             </a:r>
-            <a:endParaRPr lang="it-IT" sz="800" dirty="0" smtClean="0">
+            <a:endParaRPr lang="it-IT" sz="800" dirty="0">
               <a:solidFill>
                 <a:schemeClr val="bg1"/>
               </a:solidFill>
@@ -5378,7 +5222,1102 @@
     </p:spTree>
     <p:extLst>
       <p:ext uri="{BB962C8B-B14F-4D97-AF65-F5344CB8AC3E}">
-        <p14:creationId xmlns="" xmlns:p14="http://schemas.microsoft.com/office/powerpoint/2010/main" val="1076859714"/>
+        <p14:creationId xmlns:p14="http://schemas.microsoft.com/office/powerpoint/2010/main" val="1076859714"/>
+      </p:ext>
+    </p:extLst>
+  </p:cSld>
+  <p:clrMapOvr>
+    <a:masterClrMapping/>
+  </p:clrMapOvr>
+</p:sld>
+</file>
+
+<file path=ppt/slides/slide4.xml><?xml version="1.0" encoding="utf-8"?>
+<p:sld xmlns:a="http://schemas.openxmlformats.org/drawingml/2006/main" xmlns:r="http://schemas.openxmlformats.org/officeDocument/2006/relationships" xmlns:p="http://schemas.openxmlformats.org/presentationml/2006/main">
+  <p:cSld>
+    <p:spTree>
+      <p:nvGrpSpPr>
+        <p:cNvPr id="1" name=""/>
+        <p:cNvGrpSpPr/>
+        <p:nvPr/>
+      </p:nvGrpSpPr>
+      <p:grpSpPr>
+        <a:xfrm>
+          <a:off x="0" y="0"/>
+          <a:ext cx="0" cy="0"/>
+          <a:chOff x="0" y="0"/>
+          <a:chExt cx="0" cy="0"/>
+        </a:xfrm>
+      </p:grpSpPr>
+      <p:pic>
+        <p:nvPicPr>
+          <p:cNvPr id="2" name="Immagine 1"/>
+          <p:cNvPicPr>
+            <a:picLocks noChangeAspect="1"/>
+          </p:cNvPicPr>
+          <p:nvPr/>
+        </p:nvPicPr>
+        <p:blipFill>
+          <a:blip r:embed="rId3"/>
+          <a:stretch>
+            <a:fillRect/>
+          </a:stretch>
+        </p:blipFill>
+        <p:spPr>
+          <a:xfrm>
+            <a:off x="0" y="1707"/>
+            <a:ext cx="9180512" cy="6872633"/>
+          </a:xfrm>
+          <a:prstGeom prst="rect">
+            <a:avLst/>
+          </a:prstGeom>
+        </p:spPr>
+      </p:pic>
+      <p:sp>
+        <p:nvSpPr>
+          <p:cNvPr id="7" name="CasellaDiTesto 6"/>
+          <p:cNvSpPr txBox="1"/>
+          <p:nvPr/>
+        </p:nvSpPr>
+        <p:spPr>
+          <a:xfrm>
+            <a:off x="648253" y="1305402"/>
+            <a:ext cx="4663050" cy="461665"/>
+          </a:xfrm>
+          <a:prstGeom prst="rect">
+            <a:avLst/>
+          </a:prstGeom>
+          <a:noFill/>
+        </p:spPr>
+        <p:txBody>
+          <a:bodyPr wrap="square" rtlCol="0">
+            <a:spAutoFit/>
+          </a:bodyPr>
+          <a:lstStyle/>
+          <a:p>
+            <a:r>
+              <a:rPr lang="it-IT" sz="2400" b="1" dirty="0">
+                <a:solidFill>
+                  <a:schemeClr val="accent1">
+                    <a:lumMod val="75000"/>
+                  </a:schemeClr>
+                </a:solidFill>
+                <a:latin typeface="Arial"/>
+                <a:cs typeface="Arial"/>
+              </a:rPr>
+              <a:t>Titolo </a:t>
+            </a:r>
+            <a:r>
+              <a:rPr lang="it-IT" sz="2400" b="1" dirty="0" err="1">
+                <a:solidFill>
+                  <a:schemeClr val="accent1">
+                    <a:lumMod val="75000"/>
+                  </a:schemeClr>
+                </a:solidFill>
+                <a:latin typeface="Arial"/>
+                <a:cs typeface="Arial"/>
+              </a:rPr>
+              <a:t>arial</a:t>
+            </a:r>
+            <a:r>
+              <a:rPr lang="it-IT" sz="2400" b="1" dirty="0">
+                <a:solidFill>
+                  <a:schemeClr val="accent1">
+                    <a:lumMod val="75000"/>
+                  </a:schemeClr>
+                </a:solidFill>
+                <a:latin typeface="Arial"/>
+                <a:cs typeface="Arial"/>
+              </a:rPr>
+              <a:t> </a:t>
+            </a:r>
+            <a:r>
+              <a:rPr lang="it-IT" sz="2400" b="1" dirty="0" err="1">
+                <a:solidFill>
+                  <a:schemeClr val="accent1">
+                    <a:lumMod val="75000"/>
+                  </a:schemeClr>
+                </a:solidFill>
+                <a:latin typeface="Arial"/>
+                <a:cs typeface="Arial"/>
+              </a:rPr>
+              <a:t>bold</a:t>
+            </a:r>
+            <a:r>
+              <a:rPr lang="it-IT" sz="2400" b="1" dirty="0">
+                <a:solidFill>
+                  <a:schemeClr val="accent1">
+                    <a:lumMod val="75000"/>
+                  </a:schemeClr>
+                </a:solidFill>
+                <a:latin typeface="Arial"/>
+                <a:cs typeface="Arial"/>
+              </a:rPr>
+              <a:t> 24 </a:t>
+            </a:r>
+            <a:r>
+              <a:rPr lang="it-IT" sz="2400" b="1" dirty="0" err="1">
+                <a:solidFill>
+                  <a:schemeClr val="accent1">
+                    <a:lumMod val="75000"/>
+                  </a:schemeClr>
+                </a:solidFill>
+                <a:latin typeface="Arial"/>
+                <a:cs typeface="Arial"/>
+              </a:rPr>
+              <a:t>pt</a:t>
+            </a:r>
+            <a:endParaRPr lang="it-IT" sz="2400" b="1" dirty="0">
+              <a:solidFill>
+                <a:schemeClr val="accent1">
+                  <a:lumMod val="75000"/>
+                </a:schemeClr>
+              </a:solidFill>
+              <a:latin typeface="Arial"/>
+              <a:cs typeface="Arial"/>
+            </a:endParaRPr>
+          </a:p>
+        </p:txBody>
+      </p:sp>
+      <p:sp>
+        <p:nvSpPr>
+          <p:cNvPr id="8" name="CasellaDiTesto 7"/>
+          <p:cNvSpPr txBox="1"/>
+          <p:nvPr/>
+        </p:nvSpPr>
+        <p:spPr>
+          <a:xfrm>
+            <a:off x="648253" y="1705113"/>
+            <a:ext cx="3071762" cy="369332"/>
+          </a:xfrm>
+          <a:prstGeom prst="rect">
+            <a:avLst/>
+          </a:prstGeom>
+          <a:noFill/>
+        </p:spPr>
+        <p:txBody>
+          <a:bodyPr wrap="none" rtlCol="0">
+            <a:spAutoFit/>
+          </a:bodyPr>
+          <a:lstStyle/>
+          <a:p>
+            <a:r>
+              <a:rPr lang="it-IT" dirty="0">
+                <a:latin typeface="Arial"/>
+                <a:cs typeface="Arial"/>
+              </a:rPr>
+              <a:t>Sottotitolo </a:t>
+            </a:r>
+            <a:r>
+              <a:rPr lang="it-IT" dirty="0" err="1">
+                <a:latin typeface="Arial"/>
+                <a:cs typeface="Arial"/>
+              </a:rPr>
+              <a:t>arial</a:t>
+            </a:r>
+            <a:r>
+              <a:rPr lang="it-IT" dirty="0">
+                <a:latin typeface="Arial"/>
+                <a:cs typeface="Arial"/>
+              </a:rPr>
+              <a:t> regular 18 </a:t>
+            </a:r>
+            <a:r>
+              <a:rPr lang="it-IT" dirty="0" err="1">
+                <a:latin typeface="Arial"/>
+                <a:cs typeface="Arial"/>
+              </a:rPr>
+              <a:t>pt</a:t>
+            </a:r>
+            <a:endParaRPr lang="it-IT" dirty="0">
+              <a:latin typeface="Arial"/>
+              <a:cs typeface="Arial"/>
+            </a:endParaRPr>
+          </a:p>
+        </p:txBody>
+      </p:sp>
+      <p:sp>
+        <p:nvSpPr>
+          <p:cNvPr id="9" name="CasellaDiTesto 8"/>
+          <p:cNvSpPr txBox="1"/>
+          <p:nvPr/>
+        </p:nvSpPr>
+        <p:spPr>
+          <a:xfrm>
+            <a:off x="648253" y="2650078"/>
+            <a:ext cx="7819027" cy="1815882"/>
+          </a:xfrm>
+          <a:prstGeom prst="rect">
+            <a:avLst/>
+          </a:prstGeom>
+          <a:noFill/>
+        </p:spPr>
+        <p:txBody>
+          <a:bodyPr wrap="square" rtlCol="0">
+            <a:spAutoFit/>
+          </a:bodyPr>
+          <a:lstStyle/>
+          <a:p>
+            <a:pPr algn="just"/>
+            <a:r>
+              <a:rPr lang="it-IT" sz="1400" dirty="0"/>
+              <a:t>Esempio di slide solo testo </a:t>
+            </a:r>
+            <a:r>
+              <a:rPr lang="it-IT" sz="1400" dirty="0" err="1"/>
+              <a:t>arial</a:t>
+            </a:r>
+            <a:r>
+              <a:rPr lang="it-IT" sz="1400" dirty="0"/>
+              <a:t> regular 14 </a:t>
+            </a:r>
+            <a:r>
+              <a:rPr lang="it-IT" sz="1400" dirty="0" err="1"/>
+              <a:t>pt</a:t>
+            </a:r>
+            <a:r>
+              <a:rPr lang="it-IT" sz="1400" dirty="0"/>
+              <a:t> allineamento a sinistra o giustificato Esempio di slide solo testo </a:t>
+            </a:r>
+            <a:r>
+              <a:rPr lang="it-IT" sz="1400" dirty="0" err="1"/>
+              <a:t>arial</a:t>
+            </a:r>
+            <a:r>
+              <a:rPr lang="it-IT" sz="1400" dirty="0"/>
+              <a:t> regular 14 </a:t>
+            </a:r>
+            <a:r>
+              <a:rPr lang="it-IT" sz="1400" dirty="0" err="1"/>
+              <a:t>pt</a:t>
+            </a:r>
+            <a:r>
+              <a:rPr lang="it-IT" sz="1400" dirty="0"/>
+              <a:t> allineamento a sinistra o giustificato Esempio di slide solo testo </a:t>
+            </a:r>
+            <a:r>
+              <a:rPr lang="it-IT" sz="1400" dirty="0" err="1"/>
+              <a:t>arial</a:t>
+            </a:r>
+            <a:r>
+              <a:rPr lang="it-IT" sz="1400" dirty="0"/>
+              <a:t> regular 14 </a:t>
+            </a:r>
+            <a:r>
+              <a:rPr lang="it-IT" sz="1400" dirty="0" err="1"/>
+              <a:t>pt</a:t>
+            </a:r>
+            <a:r>
+              <a:rPr lang="it-IT" sz="1400" dirty="0"/>
+              <a:t> allineamento a sinistra o giustificato Esempio di slide solo testo </a:t>
+            </a:r>
+            <a:r>
+              <a:rPr lang="it-IT" sz="1400" dirty="0" err="1"/>
+              <a:t>arial</a:t>
+            </a:r>
+            <a:r>
+              <a:rPr lang="it-IT" sz="1400" dirty="0"/>
+              <a:t> regular 14 </a:t>
+            </a:r>
+            <a:r>
+              <a:rPr lang="it-IT" sz="1400" dirty="0" err="1"/>
+              <a:t>pt</a:t>
+            </a:r>
+            <a:r>
+              <a:rPr lang="it-IT" sz="1400" dirty="0"/>
+              <a:t> allineamento a sinistra o giustificato Esempio di slide solo testo </a:t>
+            </a:r>
+            <a:r>
+              <a:rPr lang="it-IT" sz="1400" dirty="0" err="1"/>
+              <a:t>arial</a:t>
+            </a:r>
+            <a:r>
+              <a:rPr lang="it-IT" sz="1400" dirty="0"/>
+              <a:t> regular 14 </a:t>
+            </a:r>
+            <a:r>
+              <a:rPr lang="it-IT" sz="1400" dirty="0" err="1"/>
+              <a:t>pt</a:t>
+            </a:r>
+            <a:r>
+              <a:rPr lang="it-IT" sz="1400" dirty="0"/>
+              <a:t> allineamento a sinistra o giustificato Esempio di slide solo testo </a:t>
+            </a:r>
+            <a:r>
+              <a:rPr lang="it-IT" sz="1400" dirty="0" err="1"/>
+              <a:t>arial</a:t>
+            </a:r>
+            <a:r>
+              <a:rPr lang="it-IT" sz="1400" dirty="0"/>
+              <a:t> regular 14 </a:t>
+            </a:r>
+            <a:r>
+              <a:rPr lang="it-IT" sz="1400" dirty="0" err="1"/>
+              <a:t>pt</a:t>
+            </a:r>
+            <a:r>
+              <a:rPr lang="it-IT" sz="1400" dirty="0"/>
+              <a:t> allineamento a sinistra o giustificato           </a:t>
+            </a:r>
+          </a:p>
+          <a:p>
+            <a:pPr algn="just"/>
+            <a:r>
+              <a:rPr lang="it-IT" sz="1400" dirty="0"/>
+              <a:t>           </a:t>
+            </a:r>
+          </a:p>
+          <a:p>
+            <a:pPr algn="just"/>
+            <a:r>
+              <a:rPr lang="it-IT" sz="1400" dirty="0"/>
+              <a:t>           </a:t>
+            </a:r>
+          </a:p>
+          <a:p>
+            <a:pPr algn="just"/>
+            <a:r>
+              <a:rPr lang="it-IT" sz="1400" dirty="0"/>
+              <a:t>           </a:t>
+            </a:r>
+          </a:p>
+        </p:txBody>
+      </p:sp>
+      <p:sp>
+        <p:nvSpPr>
+          <p:cNvPr id="12" name="Rettangolo 11"/>
+          <p:cNvSpPr/>
+          <p:nvPr/>
+        </p:nvSpPr>
+        <p:spPr>
+          <a:xfrm>
+            <a:off x="8255000" y="6366466"/>
+            <a:ext cx="280763" cy="501650"/>
+          </a:xfrm>
+          <a:prstGeom prst="rect">
+            <a:avLst/>
+          </a:prstGeom>
+          <a:solidFill>
+            <a:srgbClr val="003053"/>
+          </a:solidFill>
+        </p:spPr>
+        <p:style>
+          <a:lnRef idx="1">
+            <a:schemeClr val="accent1"/>
+          </a:lnRef>
+          <a:fillRef idx="3">
+            <a:schemeClr val="accent1"/>
+          </a:fillRef>
+          <a:effectRef idx="2">
+            <a:schemeClr val="accent1"/>
+          </a:effectRef>
+          <a:fontRef idx="minor">
+            <a:schemeClr val="lt1"/>
+          </a:fontRef>
+        </p:style>
+        <p:txBody>
+          <a:bodyPr rtlCol="0" anchor="ctr"/>
+          <a:lstStyle/>
+          <a:p>
+            <a:pPr algn="ctr"/>
+            <a:endParaRPr lang="it-IT">
+              <a:solidFill>
+                <a:srgbClr val="003257"/>
+              </a:solidFill>
+            </a:endParaRPr>
+          </a:p>
+        </p:txBody>
+      </p:sp>
+      <p:sp>
+        <p:nvSpPr>
+          <p:cNvPr id="11" name="Segnaposto numero diapositiva 10"/>
+          <p:cNvSpPr>
+            <a:spLocks noGrp="1"/>
+          </p:cNvSpPr>
+          <p:nvPr>
+            <p:ph type="sldNum" sz="quarter" idx="12"/>
+          </p:nvPr>
+        </p:nvSpPr>
+        <p:spPr>
+          <a:xfrm>
+            <a:off x="6402163" y="6356350"/>
+            <a:ext cx="2133600" cy="365125"/>
+          </a:xfrm>
+        </p:spPr>
+        <p:txBody>
+          <a:bodyPr/>
+          <a:lstStyle/>
+          <a:p>
+            <a:fld id="{8EB8520A-26EA-DE4B-B141-4532FC98FF0E}" type="slidenum">
+              <a:rPr lang="it-IT" b="1" smtClean="0">
+                <a:solidFill>
+                  <a:schemeClr val="bg1"/>
+                </a:solidFill>
+                <a:latin typeface="Arial"/>
+                <a:cs typeface="Arial"/>
+              </a:rPr>
+              <a:pPr/>
+              <a:t>4</a:t>
+            </a:fld>
+            <a:endParaRPr lang="it-IT" b="1" dirty="0">
+              <a:solidFill>
+                <a:schemeClr val="bg1"/>
+              </a:solidFill>
+              <a:latin typeface="Arial"/>
+              <a:cs typeface="Arial"/>
+            </a:endParaRPr>
+          </a:p>
+        </p:txBody>
+      </p:sp>
+      <p:sp>
+        <p:nvSpPr>
+          <p:cNvPr id="10" name="CasellaDiTesto 9"/>
+          <p:cNvSpPr txBox="1"/>
+          <p:nvPr/>
+        </p:nvSpPr>
+        <p:spPr>
+          <a:xfrm>
+            <a:off x="7508873" y="51433"/>
+            <a:ext cx="1184940" cy="338554"/>
+          </a:xfrm>
+          <a:prstGeom prst="rect">
+            <a:avLst/>
+          </a:prstGeom>
+          <a:noFill/>
+        </p:spPr>
+        <p:txBody>
+          <a:bodyPr wrap="none" rtlCol="0">
+            <a:spAutoFit/>
+          </a:bodyPr>
+          <a:lstStyle/>
+          <a:p>
+            <a:pPr algn="r"/>
+            <a:r>
+              <a:rPr lang="it-IT" sz="800" b="1" dirty="0">
+                <a:solidFill>
+                  <a:schemeClr val="bg1"/>
+                </a:solidFill>
+                <a:latin typeface="Arial"/>
+                <a:cs typeface="Arial"/>
+              </a:rPr>
+              <a:t>Titolo presentazione </a:t>
+            </a:r>
+          </a:p>
+          <a:p>
+            <a:pPr algn="r"/>
+            <a:r>
+              <a:rPr lang="it-IT" sz="800" b="1" dirty="0" err="1">
+                <a:solidFill>
+                  <a:schemeClr val="bg1"/>
+                </a:solidFill>
+                <a:latin typeface="Arial"/>
+                <a:cs typeface="Arial"/>
+              </a:rPr>
+              <a:t>arial</a:t>
+            </a:r>
+            <a:r>
+              <a:rPr lang="it-IT" sz="800" b="1" dirty="0">
+                <a:solidFill>
+                  <a:schemeClr val="bg1"/>
+                </a:solidFill>
+                <a:latin typeface="Arial"/>
+                <a:cs typeface="Arial"/>
+              </a:rPr>
+              <a:t> </a:t>
+            </a:r>
+            <a:r>
+              <a:rPr lang="it-IT" sz="800" b="1" dirty="0" err="1">
+                <a:solidFill>
+                  <a:schemeClr val="bg1"/>
+                </a:solidFill>
+                <a:latin typeface="Arial"/>
+                <a:cs typeface="Arial"/>
+              </a:rPr>
+              <a:t>bold</a:t>
+            </a:r>
+            <a:r>
+              <a:rPr lang="it-IT" sz="800" b="1" dirty="0">
+                <a:solidFill>
+                  <a:schemeClr val="bg1"/>
+                </a:solidFill>
+                <a:latin typeface="Arial"/>
+                <a:cs typeface="Arial"/>
+              </a:rPr>
+              <a:t> 8 </a:t>
+            </a:r>
+            <a:r>
+              <a:rPr lang="it-IT" sz="800" b="1" dirty="0" err="1">
+                <a:solidFill>
+                  <a:schemeClr val="bg1"/>
+                </a:solidFill>
+                <a:latin typeface="Arial"/>
+                <a:cs typeface="Arial"/>
+              </a:rPr>
+              <a:t>pt</a:t>
+            </a:r>
+            <a:endParaRPr lang="it-IT" sz="800" b="1" dirty="0">
+              <a:solidFill>
+                <a:schemeClr val="bg1"/>
+              </a:solidFill>
+              <a:latin typeface="Arial"/>
+              <a:cs typeface="Arial"/>
+            </a:endParaRPr>
+          </a:p>
+        </p:txBody>
+      </p:sp>
+      <p:sp>
+        <p:nvSpPr>
+          <p:cNvPr id="14" name="CasellaDiTesto 13"/>
+          <p:cNvSpPr txBox="1"/>
+          <p:nvPr/>
+        </p:nvSpPr>
+        <p:spPr>
+          <a:xfrm>
+            <a:off x="7082015" y="403482"/>
+            <a:ext cx="1621846" cy="492443"/>
+          </a:xfrm>
+          <a:prstGeom prst="rect">
+            <a:avLst/>
+          </a:prstGeom>
+          <a:noFill/>
+        </p:spPr>
+        <p:txBody>
+          <a:bodyPr wrap="none" rtlCol="0">
+            <a:spAutoFit/>
+          </a:bodyPr>
+          <a:lstStyle/>
+          <a:p>
+            <a:pPr algn="r"/>
+            <a:r>
+              <a:rPr lang="it-IT" sz="800" dirty="0">
+                <a:solidFill>
+                  <a:schemeClr val="bg1"/>
+                </a:solidFill>
+                <a:latin typeface="Arial"/>
+                <a:cs typeface="Arial"/>
+              </a:rPr>
+              <a:t>Luogo e data </a:t>
+            </a:r>
+            <a:r>
+              <a:rPr lang="it-IT" sz="800" dirty="0" err="1">
+                <a:solidFill>
+                  <a:schemeClr val="bg1"/>
+                </a:solidFill>
+                <a:latin typeface="Arial"/>
+                <a:cs typeface="Arial"/>
+              </a:rPr>
+              <a:t>arial</a:t>
+            </a:r>
+            <a:r>
+              <a:rPr lang="it-IT" sz="800" dirty="0">
+                <a:solidFill>
+                  <a:schemeClr val="bg1"/>
+                </a:solidFill>
+                <a:latin typeface="Arial"/>
+                <a:cs typeface="Arial"/>
+              </a:rPr>
+              <a:t> regular 8 </a:t>
+            </a:r>
+            <a:r>
+              <a:rPr lang="it-IT" sz="800" dirty="0" err="1">
+                <a:solidFill>
+                  <a:schemeClr val="bg1"/>
+                </a:solidFill>
+                <a:latin typeface="Arial"/>
+                <a:cs typeface="Arial"/>
+              </a:rPr>
+              <a:t>pt</a:t>
+            </a:r>
+            <a:endParaRPr lang="it-IT" sz="800" dirty="0">
+              <a:solidFill>
+                <a:schemeClr val="bg1"/>
+              </a:solidFill>
+              <a:latin typeface="Arial"/>
+              <a:cs typeface="Arial"/>
+            </a:endParaRPr>
+          </a:p>
+          <a:p>
+            <a:endParaRPr lang="it-IT" dirty="0"/>
+          </a:p>
+        </p:txBody>
+      </p:sp>
+    </p:spTree>
+    <p:extLst>
+      <p:ext uri="{BB962C8B-B14F-4D97-AF65-F5344CB8AC3E}">
+        <p14:creationId xmlns:p14="http://schemas.microsoft.com/office/powerpoint/2010/main" val="1317185678"/>
+      </p:ext>
+    </p:extLst>
+  </p:cSld>
+  <p:clrMapOvr>
+    <a:masterClrMapping/>
+  </p:clrMapOvr>
+</p:sld>
+</file>
+
+<file path=ppt/slides/slide5.xml><?xml version="1.0" encoding="utf-8"?>
+<p:sld xmlns:a="http://schemas.openxmlformats.org/drawingml/2006/main" xmlns:r="http://schemas.openxmlformats.org/officeDocument/2006/relationships" xmlns:p="http://schemas.openxmlformats.org/presentationml/2006/main">
+  <p:cSld>
+    <p:spTree>
+      <p:nvGrpSpPr>
+        <p:cNvPr id="1" name=""/>
+        <p:cNvGrpSpPr/>
+        <p:nvPr/>
+      </p:nvGrpSpPr>
+      <p:grpSpPr>
+        <a:xfrm>
+          <a:off x="0" y="0"/>
+          <a:ext cx="0" cy="0"/>
+          <a:chOff x="0" y="0"/>
+          <a:chExt cx="0" cy="0"/>
+        </a:xfrm>
+      </p:grpSpPr>
+      <p:pic>
+        <p:nvPicPr>
+          <p:cNvPr id="13" name="Immagine 12"/>
+          <p:cNvPicPr>
+            <a:picLocks noChangeAspect="1"/>
+          </p:cNvPicPr>
+          <p:nvPr/>
+        </p:nvPicPr>
+        <p:blipFill>
+          <a:blip r:embed="rId3"/>
+          <a:stretch>
+            <a:fillRect/>
+          </a:stretch>
+        </p:blipFill>
+        <p:spPr>
+          <a:xfrm>
+            <a:off x="0" y="-21160"/>
+            <a:ext cx="9180512" cy="6872633"/>
+          </a:xfrm>
+          <a:prstGeom prst="rect">
+            <a:avLst/>
+          </a:prstGeom>
+        </p:spPr>
+      </p:pic>
+      <p:pic>
+        <p:nvPicPr>
+          <p:cNvPr id="2" name="Immagine 1" descr="Rettorato_firenze,_scale_02.JPG"/>
+          <p:cNvPicPr>
+            <a:picLocks noChangeAspect="1"/>
+          </p:cNvPicPr>
+          <p:nvPr/>
+        </p:nvPicPr>
+        <p:blipFill>
+          <a:blip r:embed="rId4">
+            <a:extLst>
+              <a:ext uri="{28A0092B-C50C-407E-A947-70E740481C1C}">
+                <a14:useLocalDpi xmlns:a14="http://schemas.microsoft.com/office/drawing/2010/main" val="0"/>
+              </a:ext>
+            </a:extLst>
+          </a:blip>
+          <a:stretch>
+            <a:fillRect/>
+          </a:stretch>
+        </p:blipFill>
+        <p:spPr>
+          <a:xfrm>
+            <a:off x="723901" y="1475408"/>
+            <a:ext cx="7892796" cy="3358614"/>
+          </a:xfrm>
+          <a:prstGeom prst="rect">
+            <a:avLst/>
+          </a:prstGeom>
+        </p:spPr>
+      </p:pic>
+      <p:sp>
+        <p:nvSpPr>
+          <p:cNvPr id="9" name="CasellaDiTesto 8"/>
+          <p:cNvSpPr txBox="1"/>
+          <p:nvPr/>
+        </p:nvSpPr>
+        <p:spPr>
+          <a:xfrm>
+            <a:off x="670207" y="4834022"/>
+            <a:ext cx="7983516" cy="899234"/>
+          </a:xfrm>
+          <a:prstGeom prst="rect">
+            <a:avLst/>
+          </a:prstGeom>
+          <a:noFill/>
+        </p:spPr>
+        <p:txBody>
+          <a:bodyPr wrap="square" rtlCol="0">
+            <a:spAutoFit/>
+          </a:bodyPr>
+          <a:lstStyle/>
+          <a:p>
+            <a:pPr algn="just"/>
+            <a:r>
+              <a:rPr lang="it-IT" sz="1200" dirty="0">
+                <a:latin typeface="Arial"/>
+                <a:cs typeface="Arial"/>
+              </a:rPr>
+              <a:t>didascalia </a:t>
+            </a:r>
+            <a:r>
+              <a:rPr lang="it-IT" sz="1200" dirty="0" err="1">
+                <a:latin typeface="Arial"/>
+                <a:cs typeface="Arial"/>
+              </a:rPr>
+              <a:t>arial</a:t>
+            </a:r>
+            <a:r>
+              <a:rPr lang="it-IT" sz="1200" dirty="0">
+                <a:latin typeface="Arial"/>
+                <a:cs typeface="Arial"/>
+              </a:rPr>
+              <a:t> regular 12 </a:t>
+            </a:r>
+            <a:r>
+              <a:rPr lang="it-IT" sz="1200" dirty="0" err="1">
+                <a:latin typeface="Arial"/>
+                <a:cs typeface="Arial"/>
+              </a:rPr>
+              <a:t>pt</a:t>
+            </a:r>
+            <a:r>
+              <a:rPr lang="it-IT" sz="1200" dirty="0">
+                <a:latin typeface="Arial"/>
+                <a:cs typeface="Arial"/>
+              </a:rPr>
+              <a:t> allineamento a sinistra o giustificato didascalia </a:t>
+            </a:r>
+            <a:r>
+              <a:rPr lang="it-IT" sz="1200" dirty="0" err="1">
+                <a:latin typeface="Arial"/>
+                <a:cs typeface="Arial"/>
+              </a:rPr>
+              <a:t>arial</a:t>
+            </a:r>
+            <a:r>
+              <a:rPr lang="it-IT" sz="1200" dirty="0">
+                <a:latin typeface="Arial"/>
+                <a:cs typeface="Arial"/>
+              </a:rPr>
+              <a:t> regular 12 </a:t>
+            </a:r>
+            <a:r>
+              <a:rPr lang="it-IT" sz="1200" dirty="0" err="1">
+                <a:latin typeface="Arial"/>
+                <a:cs typeface="Arial"/>
+              </a:rPr>
+              <a:t>pt</a:t>
+            </a:r>
+            <a:r>
+              <a:rPr lang="it-IT" sz="1200" dirty="0">
+                <a:latin typeface="Arial"/>
+                <a:cs typeface="Arial"/>
+              </a:rPr>
+              <a:t> allineamento a sinistra o giustificato didascalia </a:t>
+            </a:r>
+            <a:r>
+              <a:rPr lang="it-IT" sz="1200" dirty="0" err="1">
+                <a:latin typeface="Arial"/>
+                <a:cs typeface="Arial"/>
+              </a:rPr>
+              <a:t>arial</a:t>
+            </a:r>
+            <a:r>
+              <a:rPr lang="it-IT" sz="1200" dirty="0">
+                <a:latin typeface="Arial"/>
+                <a:cs typeface="Arial"/>
+              </a:rPr>
+              <a:t> regular 12 </a:t>
+            </a:r>
+            <a:r>
+              <a:rPr lang="it-IT" sz="1200" dirty="0" err="1">
+                <a:latin typeface="Arial"/>
+                <a:cs typeface="Arial"/>
+              </a:rPr>
+              <a:t>pt</a:t>
+            </a:r>
+            <a:r>
+              <a:rPr lang="it-IT" sz="1200" dirty="0">
+                <a:latin typeface="Arial"/>
+                <a:cs typeface="Arial"/>
+              </a:rPr>
+              <a:t> allineamento a sinistra o giustificato</a:t>
+            </a:r>
+          </a:p>
+          <a:p>
+            <a:pPr algn="just"/>
+            <a:r>
+              <a:rPr lang="it-IT" sz="1400" dirty="0"/>
+              <a:t>           </a:t>
+            </a:r>
+          </a:p>
+          <a:p>
+            <a:pPr algn="just"/>
+            <a:r>
+              <a:rPr lang="it-IT" sz="1400" dirty="0"/>
+              <a:t>           </a:t>
+            </a:r>
+          </a:p>
+        </p:txBody>
+      </p:sp>
+      <p:sp>
+        <p:nvSpPr>
+          <p:cNvPr id="12" name="Rettangolo 11"/>
+          <p:cNvSpPr/>
+          <p:nvPr/>
+        </p:nvSpPr>
+        <p:spPr>
+          <a:xfrm>
+            <a:off x="8255000" y="6366466"/>
+            <a:ext cx="280763" cy="501650"/>
+          </a:xfrm>
+          <a:prstGeom prst="rect">
+            <a:avLst/>
+          </a:prstGeom>
+          <a:solidFill>
+            <a:srgbClr val="003053"/>
+          </a:solidFill>
+        </p:spPr>
+        <p:style>
+          <a:lnRef idx="1">
+            <a:schemeClr val="accent1"/>
+          </a:lnRef>
+          <a:fillRef idx="3">
+            <a:schemeClr val="accent1"/>
+          </a:fillRef>
+          <a:effectRef idx="2">
+            <a:schemeClr val="accent1"/>
+          </a:effectRef>
+          <a:fontRef idx="minor">
+            <a:schemeClr val="lt1"/>
+          </a:fontRef>
+        </p:style>
+        <p:txBody>
+          <a:bodyPr rtlCol="0" anchor="ctr"/>
+          <a:lstStyle/>
+          <a:p>
+            <a:pPr algn="ctr"/>
+            <a:endParaRPr lang="it-IT">
+              <a:solidFill>
+                <a:srgbClr val="003257"/>
+              </a:solidFill>
+            </a:endParaRPr>
+          </a:p>
+        </p:txBody>
+      </p:sp>
+      <p:sp>
+        <p:nvSpPr>
+          <p:cNvPr id="11" name="Segnaposto numero diapositiva 10"/>
+          <p:cNvSpPr>
+            <a:spLocks noGrp="1"/>
+          </p:cNvSpPr>
+          <p:nvPr>
+            <p:ph type="sldNum" sz="quarter" idx="12"/>
+          </p:nvPr>
+        </p:nvSpPr>
+        <p:spPr>
+          <a:xfrm>
+            <a:off x="6402163" y="6356350"/>
+            <a:ext cx="2133600" cy="365125"/>
+          </a:xfrm>
+        </p:spPr>
+        <p:txBody>
+          <a:bodyPr/>
+          <a:lstStyle/>
+          <a:p>
+            <a:fld id="{8EB8520A-26EA-DE4B-B141-4532FC98FF0E}" type="slidenum">
+              <a:rPr lang="it-IT" b="1" smtClean="0">
+                <a:solidFill>
+                  <a:schemeClr val="bg1"/>
+                </a:solidFill>
+                <a:latin typeface="Arial"/>
+                <a:cs typeface="Arial"/>
+              </a:rPr>
+              <a:pPr/>
+              <a:t>5</a:t>
+            </a:fld>
+            <a:endParaRPr lang="it-IT" b="1" dirty="0">
+              <a:solidFill>
+                <a:schemeClr val="bg1"/>
+              </a:solidFill>
+              <a:latin typeface="Arial"/>
+              <a:cs typeface="Arial"/>
+            </a:endParaRPr>
+          </a:p>
+        </p:txBody>
+      </p:sp>
+      <p:sp>
+        <p:nvSpPr>
+          <p:cNvPr id="10" name="CasellaDiTesto 9"/>
+          <p:cNvSpPr txBox="1"/>
+          <p:nvPr/>
+        </p:nvSpPr>
+        <p:spPr>
+          <a:xfrm>
+            <a:off x="7508873" y="51433"/>
+            <a:ext cx="1184940" cy="338554"/>
+          </a:xfrm>
+          <a:prstGeom prst="rect">
+            <a:avLst/>
+          </a:prstGeom>
+          <a:noFill/>
+        </p:spPr>
+        <p:txBody>
+          <a:bodyPr wrap="none" rtlCol="0">
+            <a:spAutoFit/>
+          </a:bodyPr>
+          <a:lstStyle/>
+          <a:p>
+            <a:pPr algn="r"/>
+            <a:r>
+              <a:rPr lang="it-IT" sz="800" b="1" dirty="0">
+                <a:solidFill>
+                  <a:schemeClr val="bg1"/>
+                </a:solidFill>
+                <a:latin typeface="Arial"/>
+                <a:cs typeface="Arial"/>
+              </a:rPr>
+              <a:t>Titolo presentazione </a:t>
+            </a:r>
+          </a:p>
+          <a:p>
+            <a:pPr algn="r"/>
+            <a:r>
+              <a:rPr lang="it-IT" sz="800" b="1" dirty="0" err="1">
+                <a:solidFill>
+                  <a:schemeClr val="bg1"/>
+                </a:solidFill>
+                <a:latin typeface="Arial"/>
+                <a:cs typeface="Arial"/>
+              </a:rPr>
+              <a:t>arial</a:t>
+            </a:r>
+            <a:r>
+              <a:rPr lang="it-IT" sz="800" b="1" dirty="0">
+                <a:solidFill>
+                  <a:schemeClr val="bg1"/>
+                </a:solidFill>
+                <a:latin typeface="Arial"/>
+                <a:cs typeface="Arial"/>
+              </a:rPr>
+              <a:t> </a:t>
+            </a:r>
+            <a:r>
+              <a:rPr lang="it-IT" sz="800" b="1" dirty="0" err="1">
+                <a:solidFill>
+                  <a:schemeClr val="bg1"/>
+                </a:solidFill>
+                <a:latin typeface="Arial"/>
+                <a:cs typeface="Arial"/>
+              </a:rPr>
+              <a:t>bold</a:t>
+            </a:r>
+            <a:r>
+              <a:rPr lang="it-IT" sz="800" b="1" dirty="0">
+                <a:solidFill>
+                  <a:schemeClr val="bg1"/>
+                </a:solidFill>
+                <a:latin typeface="Arial"/>
+                <a:cs typeface="Arial"/>
+              </a:rPr>
+              <a:t> 8 </a:t>
+            </a:r>
+            <a:r>
+              <a:rPr lang="it-IT" sz="800" b="1" dirty="0" err="1">
+                <a:solidFill>
+                  <a:schemeClr val="bg1"/>
+                </a:solidFill>
+                <a:latin typeface="Arial"/>
+                <a:cs typeface="Arial"/>
+              </a:rPr>
+              <a:t>pt</a:t>
+            </a:r>
+            <a:endParaRPr lang="it-IT" sz="800" b="1" dirty="0">
+              <a:solidFill>
+                <a:schemeClr val="bg1"/>
+              </a:solidFill>
+              <a:latin typeface="Arial"/>
+              <a:cs typeface="Arial"/>
+            </a:endParaRPr>
+          </a:p>
+        </p:txBody>
+      </p:sp>
+      <p:sp>
+        <p:nvSpPr>
+          <p:cNvPr id="14" name="CasellaDiTesto 13"/>
+          <p:cNvSpPr txBox="1"/>
+          <p:nvPr/>
+        </p:nvSpPr>
+        <p:spPr>
+          <a:xfrm>
+            <a:off x="7082015" y="403482"/>
+            <a:ext cx="1621846" cy="492443"/>
+          </a:xfrm>
+          <a:prstGeom prst="rect">
+            <a:avLst/>
+          </a:prstGeom>
+          <a:noFill/>
+        </p:spPr>
+        <p:txBody>
+          <a:bodyPr wrap="none" rtlCol="0">
+            <a:spAutoFit/>
+          </a:bodyPr>
+          <a:lstStyle/>
+          <a:p>
+            <a:pPr algn="r"/>
+            <a:r>
+              <a:rPr lang="it-IT" sz="800" dirty="0">
+                <a:solidFill>
+                  <a:schemeClr val="bg1"/>
+                </a:solidFill>
+                <a:latin typeface="Arial"/>
+                <a:cs typeface="Arial"/>
+              </a:rPr>
+              <a:t>Luogo e data </a:t>
+            </a:r>
+            <a:r>
+              <a:rPr lang="it-IT" sz="800" dirty="0" err="1">
+                <a:solidFill>
+                  <a:schemeClr val="bg1"/>
+                </a:solidFill>
+                <a:latin typeface="Arial"/>
+                <a:cs typeface="Arial"/>
+              </a:rPr>
+              <a:t>arial</a:t>
+            </a:r>
+            <a:r>
+              <a:rPr lang="it-IT" sz="800" dirty="0">
+                <a:solidFill>
+                  <a:schemeClr val="bg1"/>
+                </a:solidFill>
+                <a:latin typeface="Arial"/>
+                <a:cs typeface="Arial"/>
+              </a:rPr>
+              <a:t> regular 8 </a:t>
+            </a:r>
+            <a:r>
+              <a:rPr lang="it-IT" sz="800" dirty="0" err="1">
+                <a:solidFill>
+                  <a:schemeClr val="bg1"/>
+                </a:solidFill>
+                <a:latin typeface="Arial"/>
+                <a:cs typeface="Arial"/>
+              </a:rPr>
+              <a:t>pt</a:t>
+            </a:r>
+            <a:endParaRPr lang="it-IT" sz="800" dirty="0">
+              <a:solidFill>
+                <a:schemeClr val="bg1"/>
+              </a:solidFill>
+              <a:latin typeface="Arial"/>
+              <a:cs typeface="Arial"/>
+            </a:endParaRPr>
+          </a:p>
+          <a:p>
+            <a:endParaRPr lang="it-IT" dirty="0"/>
+          </a:p>
+        </p:txBody>
+      </p:sp>
+    </p:spTree>
+    <p:extLst>
+      <p:ext uri="{BB962C8B-B14F-4D97-AF65-F5344CB8AC3E}">
+        <p14:creationId xmlns:p14="http://schemas.microsoft.com/office/powerpoint/2010/main" val="4108044385"/>
       </p:ext>
     </p:extLst>
   </p:cSld>

</xml_diff>